<commit_message>
Added outlines for report and presentation
</commit_message>
<xml_diff>
--- a/deliverables/Week 8 - Presentation.pptx
+++ b/deliverables/Week 8 - Presentation.pptx
@@ -6,6 +6,11 @@
   </p:sldMasterIdLst>
   <p:sldIdLst>
     <p:sldId id="256" r:id="rId2"/>
+    <p:sldId id="257" r:id="rId3"/>
+    <p:sldId id="258" r:id="rId4"/>
+    <p:sldId id="259" r:id="rId5"/>
+    <p:sldId id="260" r:id="rId6"/>
+    <p:sldId id="261" r:id="rId7"/>
   </p:sldIdLst>
   <p:sldSz cx="12192000" cy="6858000"/>
   <p:notesSz cx="6858000" cy="9144000"/>
@@ -104,6 +109,11 @@
       </a:defRPr>
     </a:lvl9pPr>
   </p:defaultTextStyle>
+  <p:extLst>
+    <p:ext uri="{EFAFB233-063F-42B5-8137-9DF3F51BA10A}">
+      <p15:sldGuideLst xmlns:p15="http://schemas.microsoft.com/office/powerpoint/2012/main"/>
+    </p:ext>
+  </p:extLst>
 </p:presentation>
 </file>
 
@@ -3339,35 +3349,158 @@
         </p:nvSpPr>
         <p:spPr/>
         <p:txBody>
-          <a:bodyPr/>
-          <a:lstStyle/>
-          <a:p>
+          <a:bodyPr>
+            <a:normAutofit fontScale="90000"/>
+          </a:bodyPr>
+          <a:lstStyle/>
+          <a:p>
+            <a:pPr algn="l"/>
+            <a:r>
+              <a:rPr lang="en-US" b="1" dirty="0"/>
+              <a:t>Loan Approval Risk Simulation for an Aging Population</a:t>
+            </a:r>
+            <a:r>
+              <a:rPr lang="en-US" dirty="0"/>
+              <a:t> </a:t>
+            </a:r>
+          </a:p>
+        </p:txBody>
+      </p:sp>
+      <p:sp>
+        <p:nvSpPr>
+          <p:cNvPr id="3" name="Subtitle 2">
+            <a:extLst>
+              <a:ext uri="{FF2B5EF4-FFF2-40B4-BE49-F238E27FC236}">
+                <a16:creationId xmlns:a16="http://schemas.microsoft.com/office/drawing/2014/main" id="{8E133B9F-7421-8312-487B-D94F6A277771}"/>
+              </a:ext>
+            </a:extLst>
+          </p:cNvPr>
+          <p:cNvSpPr>
+            <a:spLocks noGrp="1"/>
+          </p:cNvSpPr>
+          <p:nvPr>
+            <p:ph type="subTitle" idx="1"/>
+          </p:nvPr>
+        </p:nvSpPr>
+        <p:spPr/>
+        <p:txBody>
+          <a:bodyPr>
+            <a:normAutofit fontScale="92500"/>
+          </a:bodyPr>
+          <a:lstStyle/>
+          <a:p>
+            <a:pPr algn="l"/>
+            <a:r>
+              <a:rPr lang="en-US" sz="2000" i="1" dirty="0"/>
+              <a:t>Explores how loan approval outcomes and financial risk evolve as the population ages</a:t>
+            </a:r>
+          </a:p>
+          <a:p>
+            <a:pPr algn="l"/>
+            <a:endParaRPr lang="en-US" sz="2000" i="1" dirty="0"/>
+          </a:p>
+          <a:p>
+            <a:pPr algn="l"/>
+            <a:r>
+              <a:rPr lang="en-US" sz="2000" i="1" dirty="0"/>
+              <a:t>MIHRET TESFAYE (LEAD)</a:t>
+            </a:r>
+          </a:p>
+          <a:p>
+            <a:pPr algn="l"/>
+            <a:r>
+              <a:rPr lang="en-US" sz="2000" i="1" dirty="0"/>
+              <a:t>JOSHUA DAVIS</a:t>
+            </a:r>
+          </a:p>
+        </p:txBody>
+      </p:sp>
+      <p:sp>
+        <p:nvSpPr>
+          <p:cNvPr id="5" name="Rectangle 4">
+            <a:extLst>
+              <a:ext uri="{FF2B5EF4-FFF2-40B4-BE49-F238E27FC236}">
+                <a16:creationId xmlns:a16="http://schemas.microsoft.com/office/drawing/2014/main" id="{C5B8C5EB-4CB1-E99E-0AE4-259AA97B86D3}"/>
+              </a:ext>
+            </a:extLst>
+          </p:cNvPr>
+          <p:cNvSpPr/>
+          <p:nvPr/>
+        </p:nvSpPr>
+        <p:spPr>
+          <a:xfrm>
+            <a:off x="11296996" y="33251"/>
+            <a:ext cx="861752" cy="1433779"/>
+          </a:xfrm>
+          <a:prstGeom prst="rect">
+            <a:avLst/>
+          </a:prstGeom>
+          <a:ln>
+            <a:noFill/>
+          </a:ln>
+        </p:spPr>
+        <p:style>
+          <a:lnRef idx="2">
+            <a:schemeClr val="accent1">
+              <a:shade val="15000"/>
+            </a:schemeClr>
+          </a:lnRef>
+          <a:fillRef idx="1">
+            <a:schemeClr val="accent1"/>
+          </a:fillRef>
+          <a:effectRef idx="0">
+            <a:schemeClr val="accent1"/>
+          </a:effectRef>
+          <a:fontRef idx="minor">
+            <a:schemeClr val="lt1"/>
+          </a:fontRef>
+        </p:style>
+        <p:txBody>
+          <a:bodyPr rtlCol="0" anchor="ctr"/>
+          <a:lstStyle/>
+          <a:p>
+            <a:pPr algn="ctr"/>
             <a:endParaRPr lang="en-US"/>
           </a:p>
         </p:txBody>
       </p:sp>
       <p:sp>
         <p:nvSpPr>
-          <p:cNvPr id="3" name="Subtitle 2">
-            <a:extLst>
-              <a:ext uri="{FF2B5EF4-FFF2-40B4-BE49-F238E27FC236}">
-                <a16:creationId xmlns:a16="http://schemas.microsoft.com/office/drawing/2014/main" id="{8E133B9F-7421-8312-487B-D94F6A277771}"/>
-              </a:ext>
-            </a:extLst>
-          </p:cNvPr>
-          <p:cNvSpPr>
-            <a:spLocks noGrp="1"/>
-          </p:cNvSpPr>
-          <p:nvPr>
-            <p:ph type="subTitle" idx="1"/>
-          </p:nvPr>
-        </p:nvSpPr>
-        <p:spPr/>
-        <p:txBody>
-          <a:bodyPr/>
-          <a:lstStyle/>
-          <a:p>
-            <a:endParaRPr lang="en-US"/>
+          <p:cNvPr id="7" name="TextBox 6">
+            <a:extLst>
+              <a:ext uri="{FF2B5EF4-FFF2-40B4-BE49-F238E27FC236}">
+                <a16:creationId xmlns:a16="http://schemas.microsoft.com/office/drawing/2014/main" id="{67D4B3F5-D8B9-77C9-BC19-30D1EF7DFBB1}"/>
+              </a:ext>
+            </a:extLst>
+          </p:cNvPr>
+          <p:cNvSpPr txBox="1"/>
+          <p:nvPr/>
+        </p:nvSpPr>
+        <p:spPr>
+          <a:xfrm>
+            <a:off x="11168147" y="1146122"/>
+            <a:ext cx="1003068" cy="307777"/>
+          </a:xfrm>
+          <a:prstGeom prst="rect">
+            <a:avLst/>
+          </a:prstGeom>
+          <a:noFill/>
+        </p:spPr>
+        <p:txBody>
+          <a:bodyPr wrap="square" rtlCol="0">
+            <a:spAutoFit/>
+          </a:bodyPr>
+          <a:lstStyle/>
+          <a:p>
+            <a:pPr algn="r"/>
+            <a:r>
+              <a:rPr lang="en-US" sz="1400" dirty="0">
+                <a:solidFill>
+                  <a:schemeClr val="bg1"/>
+                </a:solidFill>
+              </a:rPr>
+              <a:t>2025</a:t>
+            </a:r>
           </a:p>
         </p:txBody>
       </p:sp>
@@ -3375,6 +3508,1075 @@
     <p:extLst>
       <p:ext uri="{BB962C8B-B14F-4D97-AF65-F5344CB8AC3E}">
         <p14:creationId xmlns:p14="http://schemas.microsoft.com/office/powerpoint/2010/main" val="3752006709"/>
+      </p:ext>
+    </p:extLst>
+  </p:cSld>
+  <p:clrMapOvr>
+    <a:masterClrMapping/>
+  </p:clrMapOvr>
+</p:sld>
+</file>
+
+<file path=ppt/slides/slide2.xml><?xml version="1.0" encoding="utf-8"?>
+<p:sld xmlns:a="http://schemas.openxmlformats.org/drawingml/2006/main" xmlns:r="http://schemas.openxmlformats.org/officeDocument/2006/relationships" xmlns:p="http://schemas.openxmlformats.org/presentationml/2006/main">
+  <p:cSld>
+    <p:spTree>
+      <p:nvGrpSpPr>
+        <p:cNvPr id="1" name="">
+          <a:extLst>
+            <a:ext uri="{FF2B5EF4-FFF2-40B4-BE49-F238E27FC236}">
+              <a16:creationId xmlns:a16="http://schemas.microsoft.com/office/drawing/2014/main" id="{2B0E90CA-1FF4-C24D-AAFB-986844BAB506}"/>
+            </a:ext>
+          </a:extLst>
+        </p:cNvPr>
+        <p:cNvGrpSpPr/>
+        <p:nvPr/>
+      </p:nvGrpSpPr>
+      <p:grpSpPr>
+        <a:xfrm>
+          <a:off x="0" y="0"/>
+          <a:ext cx="0" cy="0"/>
+          <a:chOff x="0" y="0"/>
+          <a:chExt cx="0" cy="0"/>
+        </a:xfrm>
+      </p:grpSpPr>
+      <p:sp>
+        <p:nvSpPr>
+          <p:cNvPr id="2" name="Title 1">
+            <a:extLst>
+              <a:ext uri="{FF2B5EF4-FFF2-40B4-BE49-F238E27FC236}">
+                <a16:creationId xmlns:a16="http://schemas.microsoft.com/office/drawing/2014/main" id="{80FFF58D-1B40-B897-C5C3-88D7758B3AA6}"/>
+              </a:ext>
+            </a:extLst>
+          </p:cNvPr>
+          <p:cNvSpPr>
+            <a:spLocks noGrp="1"/>
+          </p:cNvSpPr>
+          <p:nvPr>
+            <p:ph type="title"/>
+          </p:nvPr>
+        </p:nvSpPr>
+        <p:spPr/>
+        <p:txBody>
+          <a:bodyPr>
+            <a:normAutofit/>
+          </a:bodyPr>
+          <a:lstStyle/>
+          <a:p>
+            <a:pPr algn="l"/>
+            <a:r>
+              <a:rPr lang="en-US" b="1" dirty="0"/>
+              <a:t>PROBLEM &amp; QUESTION</a:t>
+            </a:r>
+            <a:endParaRPr lang="en-US" dirty="0"/>
+          </a:p>
+        </p:txBody>
+      </p:sp>
+      <p:sp>
+        <p:nvSpPr>
+          <p:cNvPr id="3" name="Subtitle 2">
+            <a:extLst>
+              <a:ext uri="{FF2B5EF4-FFF2-40B4-BE49-F238E27FC236}">
+                <a16:creationId xmlns:a16="http://schemas.microsoft.com/office/drawing/2014/main" id="{40E49C62-CEA6-2346-1FCA-4EAEBC91BFC1}"/>
+              </a:ext>
+            </a:extLst>
+          </p:cNvPr>
+          <p:cNvSpPr>
+            <a:spLocks noGrp="1"/>
+          </p:cNvSpPr>
+          <p:nvPr>
+            <p:ph idx="1"/>
+          </p:nvPr>
+        </p:nvSpPr>
+        <p:spPr/>
+        <p:txBody>
+          <a:bodyPr>
+            <a:normAutofit/>
+          </a:bodyPr>
+          <a:lstStyle/>
+          <a:p>
+            <a:pPr marL="0" indent="0" algn="l">
+              <a:buNone/>
+            </a:pPr>
+            <a:endParaRPr lang="en-US" sz="2000" i="1" dirty="0"/>
+          </a:p>
+          <a:p>
+            <a:pPr marL="0" indent="0" algn="l">
+              <a:buNone/>
+            </a:pPr>
+            <a:r>
+              <a:rPr lang="en-US" sz="2400" i="1" dirty="0"/>
+              <a:t>How will loan approval outcomes and financial risk evolve as populations age?</a:t>
+            </a:r>
+          </a:p>
+          <a:p>
+            <a:pPr marL="857250" indent="-231775"/>
+            <a:r>
+              <a:rPr lang="en-US" sz="2400" i="1" dirty="0"/>
+              <a:t>Focusing on individuals aged 50 to 70</a:t>
+            </a:r>
+          </a:p>
+          <a:p>
+            <a:pPr marL="857250" indent="-231775"/>
+            <a:r>
+              <a:rPr lang="en-US" sz="2400" i="1" dirty="0"/>
+              <a:t>Can you compare simulation against actual data???</a:t>
+            </a:r>
+          </a:p>
+        </p:txBody>
+      </p:sp>
+      <p:sp>
+        <p:nvSpPr>
+          <p:cNvPr id="5" name="Rectangle 4">
+            <a:extLst>
+              <a:ext uri="{FF2B5EF4-FFF2-40B4-BE49-F238E27FC236}">
+                <a16:creationId xmlns:a16="http://schemas.microsoft.com/office/drawing/2014/main" id="{0DB94FB1-5E42-65F0-3BCC-CD1E801438FB}"/>
+              </a:ext>
+            </a:extLst>
+          </p:cNvPr>
+          <p:cNvSpPr/>
+          <p:nvPr/>
+        </p:nvSpPr>
+        <p:spPr>
+          <a:xfrm>
+            <a:off x="11296996" y="33251"/>
+            <a:ext cx="861752" cy="1433779"/>
+          </a:xfrm>
+          <a:prstGeom prst="rect">
+            <a:avLst/>
+          </a:prstGeom>
+          <a:solidFill>
+            <a:schemeClr val="accent3"/>
+          </a:solidFill>
+          <a:ln>
+            <a:noFill/>
+          </a:ln>
+        </p:spPr>
+        <p:style>
+          <a:lnRef idx="2">
+            <a:schemeClr val="accent1">
+              <a:shade val="15000"/>
+            </a:schemeClr>
+          </a:lnRef>
+          <a:fillRef idx="1">
+            <a:schemeClr val="accent1"/>
+          </a:fillRef>
+          <a:effectRef idx="0">
+            <a:schemeClr val="accent1"/>
+          </a:effectRef>
+          <a:fontRef idx="minor">
+            <a:schemeClr val="lt1"/>
+          </a:fontRef>
+        </p:style>
+        <p:txBody>
+          <a:bodyPr rtlCol="0" anchor="ctr"/>
+          <a:lstStyle/>
+          <a:p>
+            <a:pPr algn="ctr"/>
+            <a:endParaRPr lang="en-US"/>
+          </a:p>
+        </p:txBody>
+      </p:sp>
+      <p:sp>
+        <p:nvSpPr>
+          <p:cNvPr id="6" name="TextBox 5">
+            <a:extLst>
+              <a:ext uri="{FF2B5EF4-FFF2-40B4-BE49-F238E27FC236}">
+                <a16:creationId xmlns:a16="http://schemas.microsoft.com/office/drawing/2014/main" id="{15DFB83C-4DA4-F2FE-0D17-8BB30C2B972E}"/>
+              </a:ext>
+            </a:extLst>
+          </p:cNvPr>
+          <p:cNvSpPr txBox="1"/>
+          <p:nvPr/>
+        </p:nvSpPr>
+        <p:spPr>
+          <a:xfrm>
+            <a:off x="11226338" y="1146122"/>
+            <a:ext cx="1003068" cy="307777"/>
+          </a:xfrm>
+          <a:prstGeom prst="rect">
+            <a:avLst/>
+          </a:prstGeom>
+          <a:noFill/>
+        </p:spPr>
+        <p:txBody>
+          <a:bodyPr wrap="square" rtlCol="0">
+            <a:spAutoFit/>
+          </a:bodyPr>
+          <a:lstStyle/>
+          <a:p>
+            <a:pPr algn="r"/>
+            <a:r>
+              <a:rPr lang="en-US" sz="1400" dirty="0">
+                <a:solidFill>
+                  <a:schemeClr val="bg1"/>
+                </a:solidFill>
+              </a:rPr>
+              <a:t>PROBLEM</a:t>
+            </a:r>
+          </a:p>
+        </p:txBody>
+      </p:sp>
+    </p:spTree>
+    <p:extLst>
+      <p:ext uri="{BB962C8B-B14F-4D97-AF65-F5344CB8AC3E}">
+        <p14:creationId xmlns:p14="http://schemas.microsoft.com/office/powerpoint/2010/main" val="637312842"/>
+      </p:ext>
+    </p:extLst>
+  </p:cSld>
+  <p:clrMapOvr>
+    <a:masterClrMapping/>
+  </p:clrMapOvr>
+</p:sld>
+</file>
+
+<file path=ppt/slides/slide3.xml><?xml version="1.0" encoding="utf-8"?>
+<p:sld xmlns:a="http://schemas.openxmlformats.org/drawingml/2006/main" xmlns:r="http://schemas.openxmlformats.org/officeDocument/2006/relationships" xmlns:p="http://schemas.openxmlformats.org/presentationml/2006/main">
+  <p:cSld>
+    <p:spTree>
+      <p:nvGrpSpPr>
+        <p:cNvPr id="1" name="">
+          <a:extLst>
+            <a:ext uri="{FF2B5EF4-FFF2-40B4-BE49-F238E27FC236}">
+              <a16:creationId xmlns:a16="http://schemas.microsoft.com/office/drawing/2014/main" id="{5F728FCC-0684-9C70-BF01-54F328B903CA}"/>
+            </a:ext>
+          </a:extLst>
+        </p:cNvPr>
+        <p:cNvGrpSpPr/>
+        <p:nvPr/>
+      </p:nvGrpSpPr>
+      <p:grpSpPr>
+        <a:xfrm>
+          <a:off x="0" y="0"/>
+          <a:ext cx="0" cy="0"/>
+          <a:chOff x="0" y="0"/>
+          <a:chExt cx="0" cy="0"/>
+        </a:xfrm>
+      </p:grpSpPr>
+      <p:sp>
+        <p:nvSpPr>
+          <p:cNvPr id="2" name="Title 1">
+            <a:extLst>
+              <a:ext uri="{FF2B5EF4-FFF2-40B4-BE49-F238E27FC236}">
+                <a16:creationId xmlns:a16="http://schemas.microsoft.com/office/drawing/2014/main" id="{EC5078A3-AB44-47CC-84D7-2833339CA00F}"/>
+              </a:ext>
+            </a:extLst>
+          </p:cNvPr>
+          <p:cNvSpPr>
+            <a:spLocks noGrp="1"/>
+          </p:cNvSpPr>
+          <p:nvPr>
+            <p:ph type="title"/>
+          </p:nvPr>
+        </p:nvSpPr>
+        <p:spPr/>
+        <p:txBody>
+          <a:bodyPr>
+            <a:normAutofit/>
+          </a:bodyPr>
+          <a:lstStyle/>
+          <a:p>
+            <a:pPr algn="l"/>
+            <a:r>
+              <a:rPr lang="en-US" b="1" dirty="0"/>
+              <a:t>FRAMEWORK &amp; MODEL</a:t>
+            </a:r>
+            <a:endParaRPr lang="en-US" dirty="0"/>
+          </a:p>
+        </p:txBody>
+      </p:sp>
+      <p:sp>
+        <p:nvSpPr>
+          <p:cNvPr id="3" name="Subtitle 2">
+            <a:extLst>
+              <a:ext uri="{FF2B5EF4-FFF2-40B4-BE49-F238E27FC236}">
+                <a16:creationId xmlns:a16="http://schemas.microsoft.com/office/drawing/2014/main" id="{C7CB5F94-B62A-69FC-9C3B-2D4DCA793B0D}"/>
+              </a:ext>
+            </a:extLst>
+          </p:cNvPr>
+          <p:cNvSpPr>
+            <a:spLocks noGrp="1"/>
+          </p:cNvSpPr>
+          <p:nvPr>
+            <p:ph idx="1"/>
+          </p:nvPr>
+        </p:nvSpPr>
+        <p:spPr/>
+        <p:txBody>
+          <a:bodyPr>
+            <a:normAutofit/>
+          </a:bodyPr>
+          <a:lstStyle/>
+          <a:p>
+            <a:pPr marL="0" indent="0" algn="l">
+              <a:buNone/>
+            </a:pPr>
+            <a:endParaRPr lang="en-US" sz="2000" i="1" dirty="0"/>
+          </a:p>
+          <a:p>
+            <a:pPr marL="0" indent="0" algn="l">
+              <a:buNone/>
+            </a:pPr>
+            <a:r>
+              <a:rPr lang="en-US" sz="2400" i="1" dirty="0"/>
+              <a:t>How will loan approval outcomes and financial risk evolve as populations age?</a:t>
+            </a:r>
+          </a:p>
+          <a:p>
+            <a:pPr marL="857250" indent="-231775"/>
+            <a:r>
+              <a:rPr lang="en-US" sz="2400" i="1" dirty="0"/>
+              <a:t>Focusing on individuals aged 50 to 70</a:t>
+            </a:r>
+          </a:p>
+          <a:p>
+            <a:pPr marL="857250" indent="-231775"/>
+            <a:r>
+              <a:rPr lang="en-US" sz="2400" i="1" dirty="0"/>
+              <a:t>Can you compare simulation against actual data???</a:t>
+            </a:r>
+          </a:p>
+        </p:txBody>
+      </p:sp>
+      <p:sp>
+        <p:nvSpPr>
+          <p:cNvPr id="5" name="Rectangle 4">
+            <a:extLst>
+              <a:ext uri="{FF2B5EF4-FFF2-40B4-BE49-F238E27FC236}">
+                <a16:creationId xmlns:a16="http://schemas.microsoft.com/office/drawing/2014/main" id="{CFFFFC39-D850-7D67-345A-244677F28535}"/>
+              </a:ext>
+            </a:extLst>
+          </p:cNvPr>
+          <p:cNvSpPr/>
+          <p:nvPr/>
+        </p:nvSpPr>
+        <p:spPr>
+          <a:xfrm>
+            <a:off x="11296996" y="33251"/>
+            <a:ext cx="861752" cy="1433779"/>
+          </a:xfrm>
+          <a:prstGeom prst="rect">
+            <a:avLst/>
+          </a:prstGeom>
+          <a:solidFill>
+            <a:schemeClr val="accent2">
+              <a:lumMod val="75000"/>
+            </a:schemeClr>
+          </a:solidFill>
+          <a:ln>
+            <a:noFill/>
+          </a:ln>
+        </p:spPr>
+        <p:style>
+          <a:lnRef idx="2">
+            <a:schemeClr val="accent1">
+              <a:shade val="15000"/>
+            </a:schemeClr>
+          </a:lnRef>
+          <a:fillRef idx="1">
+            <a:schemeClr val="accent1"/>
+          </a:fillRef>
+          <a:effectRef idx="0">
+            <a:schemeClr val="accent1"/>
+          </a:effectRef>
+          <a:fontRef idx="minor">
+            <a:schemeClr val="lt1"/>
+          </a:fontRef>
+        </p:style>
+        <p:txBody>
+          <a:bodyPr rtlCol="0" anchor="ctr"/>
+          <a:lstStyle/>
+          <a:p>
+            <a:pPr algn="ctr"/>
+            <a:endParaRPr lang="en-US"/>
+          </a:p>
+        </p:txBody>
+      </p:sp>
+      <p:sp>
+        <p:nvSpPr>
+          <p:cNvPr id="4" name="TextBox 3">
+            <a:extLst>
+              <a:ext uri="{FF2B5EF4-FFF2-40B4-BE49-F238E27FC236}">
+                <a16:creationId xmlns:a16="http://schemas.microsoft.com/office/drawing/2014/main" id="{FEB6B241-8834-46F5-98FC-6039B2E24498}"/>
+              </a:ext>
+            </a:extLst>
+          </p:cNvPr>
+          <p:cNvSpPr txBox="1"/>
+          <p:nvPr/>
+        </p:nvSpPr>
+        <p:spPr>
+          <a:xfrm>
+            <a:off x="11168147" y="1146122"/>
+            <a:ext cx="1003068" cy="307777"/>
+          </a:xfrm>
+          <a:prstGeom prst="rect">
+            <a:avLst/>
+          </a:prstGeom>
+          <a:noFill/>
+        </p:spPr>
+        <p:txBody>
+          <a:bodyPr wrap="square" rtlCol="0">
+            <a:spAutoFit/>
+          </a:bodyPr>
+          <a:lstStyle/>
+          <a:p>
+            <a:pPr algn="r"/>
+            <a:r>
+              <a:rPr lang="en-US" sz="1400" dirty="0">
+                <a:solidFill>
+                  <a:schemeClr val="bg1"/>
+                </a:solidFill>
+              </a:rPr>
+              <a:t>MODEL</a:t>
+            </a:r>
+          </a:p>
+        </p:txBody>
+      </p:sp>
+    </p:spTree>
+    <p:extLst>
+      <p:ext uri="{BB962C8B-B14F-4D97-AF65-F5344CB8AC3E}">
+        <p14:creationId xmlns:p14="http://schemas.microsoft.com/office/powerpoint/2010/main" val="3705088048"/>
+      </p:ext>
+    </p:extLst>
+  </p:cSld>
+  <p:clrMapOvr>
+    <a:masterClrMapping/>
+  </p:clrMapOvr>
+</p:sld>
+</file>
+
+<file path=ppt/slides/slide4.xml><?xml version="1.0" encoding="utf-8"?>
+<p:sld xmlns:a="http://schemas.openxmlformats.org/drawingml/2006/main" xmlns:r="http://schemas.openxmlformats.org/officeDocument/2006/relationships" xmlns:p="http://schemas.openxmlformats.org/presentationml/2006/main">
+  <p:cSld>
+    <p:spTree>
+      <p:nvGrpSpPr>
+        <p:cNvPr id="1" name="">
+          <a:extLst>
+            <a:ext uri="{FF2B5EF4-FFF2-40B4-BE49-F238E27FC236}">
+              <a16:creationId xmlns:a16="http://schemas.microsoft.com/office/drawing/2014/main" id="{9C5262F5-5501-A38A-E690-31295BFEF341}"/>
+            </a:ext>
+          </a:extLst>
+        </p:cNvPr>
+        <p:cNvGrpSpPr/>
+        <p:nvPr/>
+      </p:nvGrpSpPr>
+      <p:grpSpPr>
+        <a:xfrm>
+          <a:off x="0" y="0"/>
+          <a:ext cx="0" cy="0"/>
+          <a:chOff x="0" y="0"/>
+          <a:chExt cx="0" cy="0"/>
+        </a:xfrm>
+      </p:grpSpPr>
+      <p:sp>
+        <p:nvSpPr>
+          <p:cNvPr id="2" name="Title 1">
+            <a:extLst>
+              <a:ext uri="{FF2B5EF4-FFF2-40B4-BE49-F238E27FC236}">
+                <a16:creationId xmlns:a16="http://schemas.microsoft.com/office/drawing/2014/main" id="{15C6941F-EEF1-67D6-A4AD-D06C259D1777}"/>
+              </a:ext>
+            </a:extLst>
+          </p:cNvPr>
+          <p:cNvSpPr>
+            <a:spLocks noGrp="1"/>
+          </p:cNvSpPr>
+          <p:nvPr>
+            <p:ph type="title"/>
+          </p:nvPr>
+        </p:nvSpPr>
+        <p:spPr/>
+        <p:txBody>
+          <a:bodyPr>
+            <a:normAutofit/>
+          </a:bodyPr>
+          <a:lstStyle/>
+          <a:p>
+            <a:pPr algn="l"/>
+            <a:r>
+              <a:rPr lang="en-US" b="1" dirty="0"/>
+              <a:t>IMPLIMENTATION</a:t>
+            </a:r>
+            <a:endParaRPr lang="en-US" dirty="0"/>
+          </a:p>
+        </p:txBody>
+      </p:sp>
+      <p:sp>
+        <p:nvSpPr>
+          <p:cNvPr id="3" name="Subtitle 2">
+            <a:extLst>
+              <a:ext uri="{FF2B5EF4-FFF2-40B4-BE49-F238E27FC236}">
+                <a16:creationId xmlns:a16="http://schemas.microsoft.com/office/drawing/2014/main" id="{BED40128-7047-5747-7783-6287292AD95B}"/>
+              </a:ext>
+            </a:extLst>
+          </p:cNvPr>
+          <p:cNvSpPr>
+            <a:spLocks noGrp="1"/>
+          </p:cNvSpPr>
+          <p:nvPr>
+            <p:ph idx="1"/>
+          </p:nvPr>
+        </p:nvSpPr>
+        <p:spPr/>
+        <p:txBody>
+          <a:bodyPr>
+            <a:normAutofit/>
+          </a:bodyPr>
+          <a:lstStyle/>
+          <a:p>
+            <a:pPr marL="0" indent="0" algn="l">
+              <a:buNone/>
+            </a:pPr>
+            <a:endParaRPr lang="en-US" sz="2000" i="1" dirty="0"/>
+          </a:p>
+          <a:p>
+            <a:pPr marL="0" indent="0" algn="l">
+              <a:buNone/>
+            </a:pPr>
+            <a:r>
+              <a:rPr lang="en-US" sz="2400" i="1" dirty="0"/>
+              <a:t>How will loan approval outcomes and financial risk evolve as populations age?</a:t>
+            </a:r>
+          </a:p>
+          <a:p>
+            <a:pPr marL="857250" indent="-231775"/>
+            <a:r>
+              <a:rPr lang="en-US" sz="2400" i="1" dirty="0"/>
+              <a:t>Focusing on individuals aged 50 to 70</a:t>
+            </a:r>
+          </a:p>
+          <a:p>
+            <a:pPr marL="857250" indent="-231775"/>
+            <a:r>
+              <a:rPr lang="en-US" sz="2400" i="1" dirty="0"/>
+              <a:t>Can you compare simulation against actual data???</a:t>
+            </a:r>
+          </a:p>
+        </p:txBody>
+      </p:sp>
+      <p:sp>
+        <p:nvSpPr>
+          <p:cNvPr id="5" name="Rectangle 4">
+            <a:extLst>
+              <a:ext uri="{FF2B5EF4-FFF2-40B4-BE49-F238E27FC236}">
+                <a16:creationId xmlns:a16="http://schemas.microsoft.com/office/drawing/2014/main" id="{2132128C-783F-A559-9D31-877B10641071}"/>
+              </a:ext>
+            </a:extLst>
+          </p:cNvPr>
+          <p:cNvSpPr/>
+          <p:nvPr/>
+        </p:nvSpPr>
+        <p:spPr>
+          <a:xfrm>
+            <a:off x="11296996" y="33251"/>
+            <a:ext cx="861752" cy="1433779"/>
+          </a:xfrm>
+          <a:prstGeom prst="rect">
+            <a:avLst/>
+          </a:prstGeom>
+          <a:solidFill>
+            <a:schemeClr val="accent4">
+              <a:lumMod val="75000"/>
+            </a:schemeClr>
+          </a:solidFill>
+          <a:ln>
+            <a:noFill/>
+          </a:ln>
+        </p:spPr>
+        <p:style>
+          <a:lnRef idx="2">
+            <a:schemeClr val="accent1">
+              <a:shade val="15000"/>
+            </a:schemeClr>
+          </a:lnRef>
+          <a:fillRef idx="1">
+            <a:schemeClr val="accent1"/>
+          </a:fillRef>
+          <a:effectRef idx="0">
+            <a:schemeClr val="accent1"/>
+          </a:effectRef>
+          <a:fontRef idx="minor">
+            <a:schemeClr val="lt1"/>
+          </a:fontRef>
+        </p:style>
+        <p:txBody>
+          <a:bodyPr rtlCol="0" anchor="ctr"/>
+          <a:lstStyle/>
+          <a:p>
+            <a:pPr algn="ctr"/>
+            <a:endParaRPr lang="en-US"/>
+          </a:p>
+        </p:txBody>
+      </p:sp>
+      <p:sp>
+        <p:nvSpPr>
+          <p:cNvPr id="7" name="TextBox 6">
+            <a:extLst>
+              <a:ext uri="{FF2B5EF4-FFF2-40B4-BE49-F238E27FC236}">
+                <a16:creationId xmlns:a16="http://schemas.microsoft.com/office/drawing/2014/main" id="{8DD2FD27-CEED-E268-CF90-32E476D0F15B}"/>
+              </a:ext>
+            </a:extLst>
+          </p:cNvPr>
+          <p:cNvSpPr txBox="1"/>
+          <p:nvPr/>
+        </p:nvSpPr>
+        <p:spPr>
+          <a:xfrm>
+            <a:off x="11168147" y="1146122"/>
+            <a:ext cx="1003068" cy="307777"/>
+          </a:xfrm>
+          <a:prstGeom prst="rect">
+            <a:avLst/>
+          </a:prstGeom>
+          <a:noFill/>
+        </p:spPr>
+        <p:txBody>
+          <a:bodyPr wrap="square" rtlCol="0">
+            <a:spAutoFit/>
+          </a:bodyPr>
+          <a:lstStyle/>
+          <a:p>
+            <a:pPr algn="r"/>
+            <a:r>
+              <a:rPr lang="en-US" sz="1400" dirty="0">
+                <a:solidFill>
+                  <a:schemeClr val="bg1"/>
+                </a:solidFill>
+              </a:rPr>
+              <a:t>CODE</a:t>
+            </a:r>
+          </a:p>
+        </p:txBody>
+      </p:sp>
+    </p:spTree>
+    <p:extLst>
+      <p:ext uri="{BB962C8B-B14F-4D97-AF65-F5344CB8AC3E}">
+        <p14:creationId xmlns:p14="http://schemas.microsoft.com/office/powerpoint/2010/main" val="4177265609"/>
+      </p:ext>
+    </p:extLst>
+  </p:cSld>
+  <p:clrMapOvr>
+    <a:masterClrMapping/>
+  </p:clrMapOvr>
+</p:sld>
+</file>
+
+<file path=ppt/slides/slide5.xml><?xml version="1.0" encoding="utf-8"?>
+<p:sld xmlns:a="http://schemas.openxmlformats.org/drawingml/2006/main" xmlns:r="http://schemas.openxmlformats.org/officeDocument/2006/relationships" xmlns:p="http://schemas.openxmlformats.org/presentationml/2006/main">
+  <p:cSld>
+    <p:spTree>
+      <p:nvGrpSpPr>
+        <p:cNvPr id="1" name="">
+          <a:extLst>
+            <a:ext uri="{FF2B5EF4-FFF2-40B4-BE49-F238E27FC236}">
+              <a16:creationId xmlns:a16="http://schemas.microsoft.com/office/drawing/2014/main" id="{A92F35A9-FE58-391A-7D26-F916A958EAD8}"/>
+            </a:ext>
+          </a:extLst>
+        </p:cNvPr>
+        <p:cNvGrpSpPr/>
+        <p:nvPr/>
+      </p:nvGrpSpPr>
+      <p:grpSpPr>
+        <a:xfrm>
+          <a:off x="0" y="0"/>
+          <a:ext cx="0" cy="0"/>
+          <a:chOff x="0" y="0"/>
+          <a:chExt cx="0" cy="0"/>
+        </a:xfrm>
+      </p:grpSpPr>
+      <p:sp>
+        <p:nvSpPr>
+          <p:cNvPr id="2" name="Title 1">
+            <a:extLst>
+              <a:ext uri="{FF2B5EF4-FFF2-40B4-BE49-F238E27FC236}">
+                <a16:creationId xmlns:a16="http://schemas.microsoft.com/office/drawing/2014/main" id="{014FB0F3-5E32-1D6A-9863-6D63950D62CB}"/>
+              </a:ext>
+            </a:extLst>
+          </p:cNvPr>
+          <p:cNvSpPr>
+            <a:spLocks noGrp="1"/>
+          </p:cNvSpPr>
+          <p:nvPr>
+            <p:ph type="title"/>
+          </p:nvPr>
+        </p:nvSpPr>
+        <p:spPr/>
+        <p:txBody>
+          <a:bodyPr>
+            <a:normAutofit/>
+          </a:bodyPr>
+          <a:lstStyle/>
+          <a:p>
+            <a:pPr algn="l"/>
+            <a:r>
+              <a:rPr lang="en-US" b="1" dirty="0"/>
+              <a:t>ANALYSIS &amp; CONCLUSIONS</a:t>
+            </a:r>
+            <a:endParaRPr lang="en-US" dirty="0"/>
+          </a:p>
+        </p:txBody>
+      </p:sp>
+      <p:sp>
+        <p:nvSpPr>
+          <p:cNvPr id="3" name="Subtitle 2">
+            <a:extLst>
+              <a:ext uri="{FF2B5EF4-FFF2-40B4-BE49-F238E27FC236}">
+                <a16:creationId xmlns:a16="http://schemas.microsoft.com/office/drawing/2014/main" id="{47822CFB-877C-1051-E317-43C1CE0F4F66}"/>
+              </a:ext>
+            </a:extLst>
+          </p:cNvPr>
+          <p:cNvSpPr>
+            <a:spLocks noGrp="1"/>
+          </p:cNvSpPr>
+          <p:nvPr>
+            <p:ph idx="1"/>
+          </p:nvPr>
+        </p:nvSpPr>
+        <p:spPr/>
+        <p:txBody>
+          <a:bodyPr>
+            <a:normAutofit/>
+          </a:bodyPr>
+          <a:lstStyle/>
+          <a:p>
+            <a:pPr marL="0" indent="0" algn="l">
+              <a:buNone/>
+            </a:pPr>
+            <a:endParaRPr lang="en-US" sz="2000" i="1" dirty="0"/>
+          </a:p>
+          <a:p>
+            <a:pPr marL="0" indent="0" algn="l">
+              <a:buNone/>
+            </a:pPr>
+            <a:r>
+              <a:rPr lang="en-US" sz="2400" i="1" dirty="0"/>
+              <a:t>How will loan approval outcomes and financial risk evolve as populations age?</a:t>
+            </a:r>
+          </a:p>
+          <a:p>
+            <a:pPr marL="857250" indent="-231775"/>
+            <a:r>
+              <a:rPr lang="en-US" sz="2400" i="1" dirty="0"/>
+              <a:t>Focusing on individuals aged 50 to 70</a:t>
+            </a:r>
+          </a:p>
+          <a:p>
+            <a:pPr marL="857250" indent="-231775"/>
+            <a:r>
+              <a:rPr lang="en-US" sz="2400" i="1" dirty="0"/>
+              <a:t>Can you compare simulation against actual data???</a:t>
+            </a:r>
+          </a:p>
+        </p:txBody>
+      </p:sp>
+      <p:sp>
+        <p:nvSpPr>
+          <p:cNvPr id="5" name="Rectangle 4">
+            <a:extLst>
+              <a:ext uri="{FF2B5EF4-FFF2-40B4-BE49-F238E27FC236}">
+                <a16:creationId xmlns:a16="http://schemas.microsoft.com/office/drawing/2014/main" id="{40F881A0-46B5-9755-44EB-ECC39AEEDA00}"/>
+              </a:ext>
+            </a:extLst>
+          </p:cNvPr>
+          <p:cNvSpPr/>
+          <p:nvPr/>
+        </p:nvSpPr>
+        <p:spPr>
+          <a:xfrm>
+            <a:off x="11296996" y="33251"/>
+            <a:ext cx="861752" cy="1433779"/>
+          </a:xfrm>
+          <a:prstGeom prst="rect">
+            <a:avLst/>
+          </a:prstGeom>
+          <a:solidFill>
+            <a:srgbClr val="7030A0"/>
+          </a:solidFill>
+          <a:ln>
+            <a:noFill/>
+          </a:ln>
+        </p:spPr>
+        <p:style>
+          <a:lnRef idx="2">
+            <a:schemeClr val="accent1">
+              <a:shade val="15000"/>
+            </a:schemeClr>
+          </a:lnRef>
+          <a:fillRef idx="1">
+            <a:schemeClr val="accent1"/>
+          </a:fillRef>
+          <a:effectRef idx="0">
+            <a:schemeClr val="accent1"/>
+          </a:effectRef>
+          <a:fontRef idx="minor">
+            <a:schemeClr val="lt1"/>
+          </a:fontRef>
+        </p:style>
+        <p:txBody>
+          <a:bodyPr rtlCol="0" anchor="ctr"/>
+          <a:lstStyle/>
+          <a:p>
+            <a:pPr algn="ctr"/>
+            <a:endParaRPr lang="en-US"/>
+          </a:p>
+        </p:txBody>
+      </p:sp>
+      <p:sp>
+        <p:nvSpPr>
+          <p:cNvPr id="4" name="TextBox 3">
+            <a:extLst>
+              <a:ext uri="{FF2B5EF4-FFF2-40B4-BE49-F238E27FC236}">
+                <a16:creationId xmlns:a16="http://schemas.microsoft.com/office/drawing/2014/main" id="{E46C8708-16B6-3969-D4D0-39058115E0C9}"/>
+              </a:ext>
+            </a:extLst>
+          </p:cNvPr>
+          <p:cNvSpPr txBox="1"/>
+          <p:nvPr/>
+        </p:nvSpPr>
+        <p:spPr>
+          <a:xfrm>
+            <a:off x="11168147" y="1146122"/>
+            <a:ext cx="1003068" cy="307777"/>
+          </a:xfrm>
+          <a:prstGeom prst="rect">
+            <a:avLst/>
+          </a:prstGeom>
+          <a:noFill/>
+        </p:spPr>
+        <p:txBody>
+          <a:bodyPr wrap="square" rtlCol="0">
+            <a:spAutoFit/>
+          </a:bodyPr>
+          <a:lstStyle/>
+          <a:p>
+            <a:pPr algn="r"/>
+            <a:r>
+              <a:rPr lang="en-US" sz="1400" dirty="0">
+                <a:solidFill>
+                  <a:schemeClr val="bg1"/>
+                </a:solidFill>
+              </a:rPr>
+              <a:t>CHARTS</a:t>
+            </a:r>
+          </a:p>
+        </p:txBody>
+      </p:sp>
+    </p:spTree>
+    <p:extLst>
+      <p:ext uri="{BB962C8B-B14F-4D97-AF65-F5344CB8AC3E}">
+        <p14:creationId xmlns:p14="http://schemas.microsoft.com/office/powerpoint/2010/main" val="662320822"/>
+      </p:ext>
+    </p:extLst>
+  </p:cSld>
+  <p:clrMapOvr>
+    <a:masterClrMapping/>
+  </p:clrMapOvr>
+</p:sld>
+</file>
+
+<file path=ppt/slides/slide6.xml><?xml version="1.0" encoding="utf-8"?>
+<p:sld xmlns:a="http://schemas.openxmlformats.org/drawingml/2006/main" xmlns:r="http://schemas.openxmlformats.org/officeDocument/2006/relationships" xmlns:p="http://schemas.openxmlformats.org/presentationml/2006/main">
+  <p:cSld>
+    <p:spTree>
+      <p:nvGrpSpPr>
+        <p:cNvPr id="1" name="">
+          <a:extLst>
+            <a:ext uri="{FF2B5EF4-FFF2-40B4-BE49-F238E27FC236}">
+              <a16:creationId xmlns:a16="http://schemas.microsoft.com/office/drawing/2014/main" id="{0EF9BA42-94DA-8C29-E4F4-24930FBC69C8}"/>
+            </a:ext>
+          </a:extLst>
+        </p:cNvPr>
+        <p:cNvGrpSpPr/>
+        <p:nvPr/>
+      </p:nvGrpSpPr>
+      <p:grpSpPr>
+        <a:xfrm>
+          <a:off x="0" y="0"/>
+          <a:ext cx="0" cy="0"/>
+          <a:chOff x="0" y="0"/>
+          <a:chExt cx="0" cy="0"/>
+        </a:xfrm>
+      </p:grpSpPr>
+      <p:sp>
+        <p:nvSpPr>
+          <p:cNvPr id="2" name="Title 1">
+            <a:extLst>
+              <a:ext uri="{FF2B5EF4-FFF2-40B4-BE49-F238E27FC236}">
+                <a16:creationId xmlns:a16="http://schemas.microsoft.com/office/drawing/2014/main" id="{B69BAD57-CC7A-DC80-2E44-370968BAD0BC}"/>
+              </a:ext>
+            </a:extLst>
+          </p:cNvPr>
+          <p:cNvSpPr>
+            <a:spLocks noGrp="1"/>
+          </p:cNvSpPr>
+          <p:nvPr>
+            <p:ph type="title"/>
+          </p:nvPr>
+        </p:nvSpPr>
+        <p:spPr/>
+        <p:txBody>
+          <a:bodyPr>
+            <a:normAutofit/>
+          </a:bodyPr>
+          <a:lstStyle/>
+          <a:p>
+            <a:pPr algn="l"/>
+            <a:r>
+              <a:rPr lang="en-US" b="1" dirty="0"/>
+              <a:t>CONCLUSIONS</a:t>
+            </a:r>
+            <a:endParaRPr lang="en-US" dirty="0"/>
+          </a:p>
+        </p:txBody>
+      </p:sp>
+      <p:sp>
+        <p:nvSpPr>
+          <p:cNvPr id="3" name="Subtitle 2">
+            <a:extLst>
+              <a:ext uri="{FF2B5EF4-FFF2-40B4-BE49-F238E27FC236}">
+                <a16:creationId xmlns:a16="http://schemas.microsoft.com/office/drawing/2014/main" id="{000991FD-2E58-F654-E9F3-39FACE60995C}"/>
+              </a:ext>
+            </a:extLst>
+          </p:cNvPr>
+          <p:cNvSpPr>
+            <a:spLocks noGrp="1"/>
+          </p:cNvSpPr>
+          <p:nvPr>
+            <p:ph idx="1"/>
+          </p:nvPr>
+        </p:nvSpPr>
+        <p:spPr/>
+        <p:txBody>
+          <a:bodyPr>
+            <a:normAutofit/>
+          </a:bodyPr>
+          <a:lstStyle/>
+          <a:p>
+            <a:pPr marL="0" indent="0" algn="l">
+              <a:buNone/>
+            </a:pPr>
+            <a:endParaRPr lang="en-US" sz="2000" i="1" dirty="0"/>
+          </a:p>
+          <a:p>
+            <a:pPr marL="0" indent="0" algn="l">
+              <a:buNone/>
+            </a:pPr>
+            <a:r>
+              <a:rPr lang="en-US" sz="2400" i="1" dirty="0"/>
+              <a:t>How will loan approval outcomes and financial risk evolve as populations age?</a:t>
+            </a:r>
+          </a:p>
+          <a:p>
+            <a:pPr marL="857250" indent="-231775"/>
+            <a:r>
+              <a:rPr lang="en-US" sz="2400" i="1" dirty="0"/>
+              <a:t>Focusing on individuals aged 50 to 70</a:t>
+            </a:r>
+          </a:p>
+          <a:p>
+            <a:pPr marL="857250" indent="-231775"/>
+            <a:r>
+              <a:rPr lang="en-US" sz="2400" i="1" dirty="0"/>
+              <a:t>Can you compare simulation against actual data???</a:t>
+            </a:r>
+          </a:p>
+        </p:txBody>
+      </p:sp>
+      <p:sp>
+        <p:nvSpPr>
+          <p:cNvPr id="5" name="Rectangle 4">
+            <a:extLst>
+              <a:ext uri="{FF2B5EF4-FFF2-40B4-BE49-F238E27FC236}">
+                <a16:creationId xmlns:a16="http://schemas.microsoft.com/office/drawing/2014/main" id="{33239F50-2075-BC0B-52BB-54AF688A4017}"/>
+              </a:ext>
+            </a:extLst>
+          </p:cNvPr>
+          <p:cNvSpPr/>
+          <p:nvPr/>
+        </p:nvSpPr>
+        <p:spPr>
+          <a:xfrm>
+            <a:off x="11296996" y="33251"/>
+            <a:ext cx="861752" cy="1433779"/>
+          </a:xfrm>
+          <a:prstGeom prst="rect">
+            <a:avLst/>
+          </a:prstGeom>
+          <a:solidFill>
+            <a:srgbClr val="C00000"/>
+          </a:solidFill>
+          <a:ln>
+            <a:noFill/>
+          </a:ln>
+        </p:spPr>
+        <p:style>
+          <a:lnRef idx="2">
+            <a:schemeClr val="accent1">
+              <a:shade val="15000"/>
+            </a:schemeClr>
+          </a:lnRef>
+          <a:fillRef idx="1">
+            <a:schemeClr val="accent1"/>
+          </a:fillRef>
+          <a:effectRef idx="0">
+            <a:schemeClr val="accent1"/>
+          </a:effectRef>
+          <a:fontRef idx="minor">
+            <a:schemeClr val="lt1"/>
+          </a:fontRef>
+        </p:style>
+        <p:txBody>
+          <a:bodyPr rtlCol="0" anchor="ctr"/>
+          <a:lstStyle/>
+          <a:p>
+            <a:pPr algn="ctr"/>
+            <a:endParaRPr lang="en-US"/>
+          </a:p>
+        </p:txBody>
+      </p:sp>
+      <p:sp>
+        <p:nvSpPr>
+          <p:cNvPr id="4" name="TextBox 3">
+            <a:extLst>
+              <a:ext uri="{FF2B5EF4-FFF2-40B4-BE49-F238E27FC236}">
+                <a16:creationId xmlns:a16="http://schemas.microsoft.com/office/drawing/2014/main" id="{B20EC300-5572-3763-57D6-B6AEC1820959}"/>
+              </a:ext>
+            </a:extLst>
+          </p:cNvPr>
+          <p:cNvSpPr txBox="1"/>
+          <p:nvPr/>
+        </p:nvSpPr>
+        <p:spPr>
+          <a:xfrm>
+            <a:off x="11168147" y="1146122"/>
+            <a:ext cx="1003068" cy="307777"/>
+          </a:xfrm>
+          <a:prstGeom prst="rect">
+            <a:avLst/>
+          </a:prstGeom>
+          <a:noFill/>
+        </p:spPr>
+        <p:txBody>
+          <a:bodyPr wrap="square" rtlCol="0">
+            <a:spAutoFit/>
+          </a:bodyPr>
+          <a:lstStyle/>
+          <a:p>
+            <a:pPr algn="r"/>
+            <a:r>
+              <a:rPr lang="en-US" sz="1400" dirty="0">
+                <a:solidFill>
+                  <a:schemeClr val="bg1"/>
+                </a:solidFill>
+              </a:rPr>
+              <a:t>FUTURE</a:t>
+            </a:r>
+          </a:p>
+        </p:txBody>
+      </p:sp>
+    </p:spTree>
+    <p:extLst>
+      <p:ext uri="{BB962C8B-B14F-4D97-AF65-F5344CB8AC3E}">
+        <p14:creationId xmlns:p14="http://schemas.microsoft.com/office/powerpoint/2010/main" val="3852871705"/>
       </p:ext>
     </p:extLst>
   </p:cSld>

</xml_diff>

<commit_message>
Updated model to use the probability in baysien :)
</commit_message>
<xml_diff>
--- a/deliverables/Week 8 - Presentation.pptx
+++ b/deliverables/Week 8 - Presentation.pptx
@@ -4,10 +4,13 @@
   <p:sldMasterIdLst>
     <p:sldMasterId id="2147483648" r:id="rId1"/>
   </p:sldMasterIdLst>
+  <p:notesMasterIdLst>
+    <p:notesMasterId r:id="rId14"/>
+  </p:notesMasterIdLst>
   <p:sldIdLst>
     <p:sldId id="256" r:id="rId2"/>
     <p:sldId id="257" r:id="rId3"/>
-    <p:sldId id="262" r:id="rId4"/>
+    <p:sldId id="269" r:id="rId4"/>
     <p:sldId id="265" r:id="rId5"/>
     <p:sldId id="259" r:id="rId6"/>
     <p:sldId id="268" r:id="rId7"/>
@@ -123,6 +126,439 @@
 </p:presentation>
 </file>
 
+<file path=ppt/notesMasters/notesMaster1.xml><?xml version="1.0" encoding="utf-8"?>
+<p:notesMaster xmlns:a="http://schemas.openxmlformats.org/drawingml/2006/main" xmlns:r="http://schemas.openxmlformats.org/officeDocument/2006/relationships" xmlns:p="http://schemas.openxmlformats.org/presentationml/2006/main">
+  <p:cSld>
+    <p:bg>
+      <p:bgRef idx="1001">
+        <a:schemeClr val="bg1"/>
+      </p:bgRef>
+    </p:bg>
+    <p:spTree>
+      <p:nvGrpSpPr>
+        <p:cNvPr id="1" name=""/>
+        <p:cNvGrpSpPr/>
+        <p:nvPr/>
+      </p:nvGrpSpPr>
+      <p:grpSpPr>
+        <a:xfrm>
+          <a:off x="0" y="0"/>
+          <a:ext cx="0" cy="0"/>
+          <a:chOff x="0" y="0"/>
+          <a:chExt cx="0" cy="0"/>
+        </a:xfrm>
+      </p:grpSpPr>
+      <p:sp>
+        <p:nvSpPr>
+          <p:cNvPr id="2" name="Header Placeholder 1"/>
+          <p:cNvSpPr>
+            <a:spLocks noGrp="1"/>
+          </p:cNvSpPr>
+          <p:nvPr>
+            <p:ph type="hdr" sz="quarter"/>
+          </p:nvPr>
+        </p:nvSpPr>
+        <p:spPr>
+          <a:xfrm>
+            <a:off x="0" y="0"/>
+            <a:ext cx="2971800" cy="458788"/>
+          </a:xfrm>
+          <a:prstGeom prst="rect">
+            <a:avLst/>
+          </a:prstGeom>
+        </p:spPr>
+        <p:txBody>
+          <a:bodyPr vert="horz" lIns="91440" tIns="45720" rIns="91440" bIns="45720" rtlCol="0"/>
+          <a:lstStyle>
+            <a:lvl1pPr algn="l">
+              <a:defRPr sz="1200"/>
+            </a:lvl1pPr>
+          </a:lstStyle>
+          <a:p>
+            <a:endParaRPr lang="en-US"/>
+          </a:p>
+        </p:txBody>
+      </p:sp>
+      <p:sp>
+        <p:nvSpPr>
+          <p:cNvPr id="3" name="Date Placeholder 2"/>
+          <p:cNvSpPr>
+            <a:spLocks noGrp="1"/>
+          </p:cNvSpPr>
+          <p:nvPr>
+            <p:ph type="dt" idx="1"/>
+          </p:nvPr>
+        </p:nvSpPr>
+        <p:spPr>
+          <a:xfrm>
+            <a:off x="3884613" y="0"/>
+            <a:ext cx="2971800" cy="458788"/>
+          </a:xfrm>
+          <a:prstGeom prst="rect">
+            <a:avLst/>
+          </a:prstGeom>
+        </p:spPr>
+        <p:txBody>
+          <a:bodyPr vert="horz" lIns="91440" tIns="45720" rIns="91440" bIns="45720" rtlCol="0"/>
+          <a:lstStyle>
+            <a:lvl1pPr algn="r">
+              <a:defRPr sz="1200"/>
+            </a:lvl1pPr>
+          </a:lstStyle>
+          <a:p>
+            <a:fld id="{9F8027F3-24F7-D546-AC84-3FE12BDC6FB6}" type="datetimeFigureOut">
+              <a:rPr lang="en-US" smtClean="0"/>
+              <a:t>7/15/25</a:t>
+            </a:fld>
+            <a:endParaRPr lang="en-US"/>
+          </a:p>
+        </p:txBody>
+      </p:sp>
+      <p:sp>
+        <p:nvSpPr>
+          <p:cNvPr id="4" name="Slide Image Placeholder 3"/>
+          <p:cNvSpPr>
+            <a:spLocks noGrp="1" noRot="1" noChangeAspect="1"/>
+          </p:cNvSpPr>
+          <p:nvPr>
+            <p:ph type="sldImg" idx="2"/>
+          </p:nvPr>
+        </p:nvSpPr>
+        <p:spPr>
+          <a:xfrm>
+            <a:off x="685800" y="1143000"/>
+            <a:ext cx="5486400" cy="3086100"/>
+          </a:xfrm>
+          <a:prstGeom prst="rect">
+            <a:avLst/>
+          </a:prstGeom>
+          <a:noFill/>
+          <a:ln w="12700">
+            <a:solidFill>
+              <a:prstClr val="black"/>
+            </a:solidFill>
+          </a:ln>
+        </p:spPr>
+        <p:txBody>
+          <a:bodyPr vert="horz" lIns="91440" tIns="45720" rIns="91440" bIns="45720" rtlCol="0" anchor="ctr"/>
+          <a:lstStyle/>
+          <a:p>
+            <a:endParaRPr lang="en-US"/>
+          </a:p>
+        </p:txBody>
+      </p:sp>
+      <p:sp>
+        <p:nvSpPr>
+          <p:cNvPr id="5" name="Notes Placeholder 4"/>
+          <p:cNvSpPr>
+            <a:spLocks noGrp="1"/>
+          </p:cNvSpPr>
+          <p:nvPr>
+            <p:ph type="body" sz="quarter" idx="3"/>
+          </p:nvPr>
+        </p:nvSpPr>
+        <p:spPr>
+          <a:xfrm>
+            <a:off x="685800" y="4400550"/>
+            <a:ext cx="5486400" cy="3600450"/>
+          </a:xfrm>
+          <a:prstGeom prst="rect">
+            <a:avLst/>
+          </a:prstGeom>
+        </p:spPr>
+        <p:txBody>
+          <a:bodyPr vert="horz" lIns="91440" tIns="45720" rIns="91440" bIns="45720" rtlCol="0"/>
+          <a:lstStyle/>
+          <a:p>
+            <a:pPr lvl="0"/>
+            <a:r>
+              <a:rPr lang="en-US"/>
+              <a:t>Click to edit Master text styles</a:t>
+            </a:r>
+          </a:p>
+          <a:p>
+            <a:pPr lvl="1"/>
+            <a:r>
+              <a:rPr lang="en-US"/>
+              <a:t>Second level</a:t>
+            </a:r>
+          </a:p>
+          <a:p>
+            <a:pPr lvl="2"/>
+            <a:r>
+              <a:rPr lang="en-US"/>
+              <a:t>Third level</a:t>
+            </a:r>
+          </a:p>
+          <a:p>
+            <a:pPr lvl="3"/>
+            <a:r>
+              <a:rPr lang="en-US"/>
+              <a:t>Fourth level</a:t>
+            </a:r>
+          </a:p>
+          <a:p>
+            <a:pPr lvl="4"/>
+            <a:r>
+              <a:rPr lang="en-US"/>
+              <a:t>Fifth level</a:t>
+            </a:r>
+          </a:p>
+        </p:txBody>
+      </p:sp>
+      <p:sp>
+        <p:nvSpPr>
+          <p:cNvPr id="6" name="Footer Placeholder 5"/>
+          <p:cNvSpPr>
+            <a:spLocks noGrp="1"/>
+          </p:cNvSpPr>
+          <p:nvPr>
+            <p:ph type="ftr" sz="quarter" idx="4"/>
+          </p:nvPr>
+        </p:nvSpPr>
+        <p:spPr>
+          <a:xfrm>
+            <a:off x="0" y="8685213"/>
+            <a:ext cx="2971800" cy="458787"/>
+          </a:xfrm>
+          <a:prstGeom prst="rect">
+            <a:avLst/>
+          </a:prstGeom>
+        </p:spPr>
+        <p:txBody>
+          <a:bodyPr vert="horz" lIns="91440" tIns="45720" rIns="91440" bIns="45720" rtlCol="0" anchor="b"/>
+          <a:lstStyle>
+            <a:lvl1pPr algn="l">
+              <a:defRPr sz="1200"/>
+            </a:lvl1pPr>
+          </a:lstStyle>
+          <a:p>
+            <a:endParaRPr lang="en-US"/>
+          </a:p>
+        </p:txBody>
+      </p:sp>
+      <p:sp>
+        <p:nvSpPr>
+          <p:cNvPr id="7" name="Slide Number Placeholder 6"/>
+          <p:cNvSpPr>
+            <a:spLocks noGrp="1"/>
+          </p:cNvSpPr>
+          <p:nvPr>
+            <p:ph type="sldNum" sz="quarter" idx="5"/>
+          </p:nvPr>
+        </p:nvSpPr>
+        <p:spPr>
+          <a:xfrm>
+            <a:off x="3884613" y="8685213"/>
+            <a:ext cx="2971800" cy="458787"/>
+          </a:xfrm>
+          <a:prstGeom prst="rect">
+            <a:avLst/>
+          </a:prstGeom>
+        </p:spPr>
+        <p:txBody>
+          <a:bodyPr vert="horz" lIns="91440" tIns="45720" rIns="91440" bIns="45720" rtlCol="0" anchor="b"/>
+          <a:lstStyle>
+            <a:lvl1pPr algn="r">
+              <a:defRPr sz="1200"/>
+            </a:lvl1pPr>
+          </a:lstStyle>
+          <a:p>
+            <a:fld id="{306F0B26-88BC-AB46-94CF-55FDA10D9810}" type="slidenum">
+              <a:rPr lang="en-US" smtClean="0"/>
+              <a:t>‹#›</a:t>
+            </a:fld>
+            <a:endParaRPr lang="en-US"/>
+          </a:p>
+        </p:txBody>
+      </p:sp>
+    </p:spTree>
+    <p:extLst>
+      <p:ext uri="{BB962C8B-B14F-4D97-AF65-F5344CB8AC3E}">
+        <p14:creationId xmlns:p14="http://schemas.microsoft.com/office/powerpoint/2010/main" val="3676423103"/>
+      </p:ext>
+    </p:extLst>
+  </p:cSld>
+  <p:clrMap bg1="lt1" tx1="dk1" bg2="lt2" tx2="dk2" accent1="accent1" accent2="accent2" accent3="accent3" accent4="accent4" accent5="accent5" accent6="accent6" hlink="hlink" folHlink="folHlink"/>
+  <p:notesStyle>
+    <a:lvl1pPr marL="0" algn="l" defTabSz="914400" rtl="0" eaLnBrk="1" latinLnBrk="0" hangingPunct="1">
+      <a:defRPr sz="1200" kern="1200">
+        <a:solidFill>
+          <a:schemeClr val="tx1"/>
+        </a:solidFill>
+        <a:latin typeface="+mn-lt"/>
+        <a:ea typeface="+mn-ea"/>
+        <a:cs typeface="+mn-cs"/>
+      </a:defRPr>
+    </a:lvl1pPr>
+    <a:lvl2pPr marL="457200" algn="l" defTabSz="914400" rtl="0" eaLnBrk="1" latinLnBrk="0" hangingPunct="1">
+      <a:defRPr sz="1200" kern="1200">
+        <a:solidFill>
+          <a:schemeClr val="tx1"/>
+        </a:solidFill>
+        <a:latin typeface="+mn-lt"/>
+        <a:ea typeface="+mn-ea"/>
+        <a:cs typeface="+mn-cs"/>
+      </a:defRPr>
+    </a:lvl2pPr>
+    <a:lvl3pPr marL="914400" algn="l" defTabSz="914400" rtl="0" eaLnBrk="1" latinLnBrk="0" hangingPunct="1">
+      <a:defRPr sz="1200" kern="1200">
+        <a:solidFill>
+          <a:schemeClr val="tx1"/>
+        </a:solidFill>
+        <a:latin typeface="+mn-lt"/>
+        <a:ea typeface="+mn-ea"/>
+        <a:cs typeface="+mn-cs"/>
+      </a:defRPr>
+    </a:lvl3pPr>
+    <a:lvl4pPr marL="1371600" algn="l" defTabSz="914400" rtl="0" eaLnBrk="1" latinLnBrk="0" hangingPunct="1">
+      <a:defRPr sz="1200" kern="1200">
+        <a:solidFill>
+          <a:schemeClr val="tx1"/>
+        </a:solidFill>
+        <a:latin typeface="+mn-lt"/>
+        <a:ea typeface="+mn-ea"/>
+        <a:cs typeface="+mn-cs"/>
+      </a:defRPr>
+    </a:lvl4pPr>
+    <a:lvl5pPr marL="1828800" algn="l" defTabSz="914400" rtl="0" eaLnBrk="1" latinLnBrk="0" hangingPunct="1">
+      <a:defRPr sz="1200" kern="1200">
+        <a:solidFill>
+          <a:schemeClr val="tx1"/>
+        </a:solidFill>
+        <a:latin typeface="+mn-lt"/>
+        <a:ea typeface="+mn-ea"/>
+        <a:cs typeface="+mn-cs"/>
+      </a:defRPr>
+    </a:lvl5pPr>
+    <a:lvl6pPr marL="2286000" algn="l" defTabSz="914400" rtl="0" eaLnBrk="1" latinLnBrk="0" hangingPunct="1">
+      <a:defRPr sz="1200" kern="1200">
+        <a:solidFill>
+          <a:schemeClr val="tx1"/>
+        </a:solidFill>
+        <a:latin typeface="+mn-lt"/>
+        <a:ea typeface="+mn-ea"/>
+        <a:cs typeface="+mn-cs"/>
+      </a:defRPr>
+    </a:lvl6pPr>
+    <a:lvl7pPr marL="2743200" algn="l" defTabSz="914400" rtl="0" eaLnBrk="1" latinLnBrk="0" hangingPunct="1">
+      <a:defRPr sz="1200" kern="1200">
+        <a:solidFill>
+          <a:schemeClr val="tx1"/>
+        </a:solidFill>
+        <a:latin typeface="+mn-lt"/>
+        <a:ea typeface="+mn-ea"/>
+        <a:cs typeface="+mn-cs"/>
+      </a:defRPr>
+    </a:lvl7pPr>
+    <a:lvl8pPr marL="3200400" algn="l" defTabSz="914400" rtl="0" eaLnBrk="1" latinLnBrk="0" hangingPunct="1">
+      <a:defRPr sz="1200" kern="1200">
+        <a:solidFill>
+          <a:schemeClr val="tx1"/>
+        </a:solidFill>
+        <a:latin typeface="+mn-lt"/>
+        <a:ea typeface="+mn-ea"/>
+        <a:cs typeface="+mn-cs"/>
+      </a:defRPr>
+    </a:lvl8pPr>
+    <a:lvl9pPr marL="3657600" algn="l" defTabSz="914400" rtl="0" eaLnBrk="1" latinLnBrk="0" hangingPunct="1">
+      <a:defRPr sz="1200" kern="1200">
+        <a:solidFill>
+          <a:schemeClr val="tx1"/>
+        </a:solidFill>
+        <a:latin typeface="+mn-lt"/>
+        <a:ea typeface="+mn-ea"/>
+        <a:cs typeface="+mn-cs"/>
+      </a:defRPr>
+    </a:lvl9pPr>
+  </p:notesStyle>
+</p:notesMaster>
+</file>
+
+<file path=ppt/notesSlides/notesSlide1.xml><?xml version="1.0" encoding="utf-8"?>
+<p:notes xmlns:a="http://schemas.openxmlformats.org/drawingml/2006/main" xmlns:r="http://schemas.openxmlformats.org/officeDocument/2006/relationships" xmlns:p="http://schemas.openxmlformats.org/presentationml/2006/main">
+  <p:cSld>
+    <p:spTree>
+      <p:nvGrpSpPr>
+        <p:cNvPr id="1" name=""/>
+        <p:cNvGrpSpPr/>
+        <p:nvPr/>
+      </p:nvGrpSpPr>
+      <p:grpSpPr>
+        <a:xfrm>
+          <a:off x="0" y="0"/>
+          <a:ext cx="0" cy="0"/>
+          <a:chOff x="0" y="0"/>
+          <a:chExt cx="0" cy="0"/>
+        </a:xfrm>
+      </p:grpSpPr>
+      <p:sp>
+        <p:nvSpPr>
+          <p:cNvPr id="2" name="Slide Image Placeholder 1"/>
+          <p:cNvSpPr>
+            <a:spLocks noGrp="1" noRot="1" noChangeAspect="1"/>
+          </p:cNvSpPr>
+          <p:nvPr>
+            <p:ph type="sldImg"/>
+          </p:nvPr>
+        </p:nvSpPr>
+        <p:spPr/>
+      </p:sp>
+      <p:sp>
+        <p:nvSpPr>
+          <p:cNvPr id="3" name="Notes Placeholder 2"/>
+          <p:cNvSpPr>
+            <a:spLocks noGrp="1"/>
+          </p:cNvSpPr>
+          <p:nvPr>
+            <p:ph type="body" idx="1"/>
+          </p:nvPr>
+        </p:nvSpPr>
+        <p:spPr/>
+        <p:txBody>
+          <a:bodyPr/>
+          <a:lstStyle/>
+          <a:p>
+            <a:endParaRPr lang="en-US" dirty="0"/>
+          </a:p>
+        </p:txBody>
+      </p:sp>
+      <p:sp>
+        <p:nvSpPr>
+          <p:cNvPr id="4" name="Slide Number Placeholder 3"/>
+          <p:cNvSpPr>
+            <a:spLocks noGrp="1"/>
+          </p:cNvSpPr>
+          <p:nvPr>
+            <p:ph type="sldNum" sz="quarter" idx="5"/>
+          </p:nvPr>
+        </p:nvSpPr>
+        <p:spPr/>
+        <p:txBody>
+          <a:bodyPr/>
+          <a:lstStyle/>
+          <a:p>
+            <a:fld id="{306F0B26-88BC-AB46-94CF-55FDA10D9810}" type="slidenum">
+              <a:rPr lang="en-US" smtClean="0"/>
+              <a:t>3</a:t>
+            </a:fld>
+            <a:endParaRPr lang="en-US"/>
+          </a:p>
+        </p:txBody>
+      </p:sp>
+    </p:spTree>
+    <p:extLst>
+      <p:ext uri="{BB962C8B-B14F-4D97-AF65-F5344CB8AC3E}">
+        <p14:creationId xmlns:p14="http://schemas.microsoft.com/office/powerpoint/2010/main" val="2421766959"/>
+      </p:ext>
+    </p:extLst>
+  </p:cSld>
+  <p:clrMapOvr>
+    <a:masterClrMapping/>
+  </p:clrMapOvr>
+</p:notes>
+</file>
+
 <file path=ppt/slideLayouts/slideLayout1.xml><?xml version="1.0" encoding="utf-8"?>
 <p:sldLayout xmlns:a="http://schemas.openxmlformats.org/drawingml/2006/main" xmlns:r="http://schemas.openxmlformats.org/officeDocument/2006/relationships" xmlns:p="http://schemas.openxmlformats.org/presentationml/2006/main" type="title" preserve="1">
   <p:cSld name="Title Slide">
@@ -270,7 +706,7 @@
           <a:p>
             <a:fld id="{5C9C18C3-3906-6C42-A7D7-F818A643B30A}" type="datetimeFigureOut">
               <a:rPr lang="en-US" smtClean="0"/>
-              <a:t>7/13/25</a:t>
+              <a:t>7/15/25</a:t>
             </a:fld>
             <a:endParaRPr lang="en-US"/>
           </a:p>
@@ -468,7 +904,7 @@
           <a:p>
             <a:fld id="{5C9C18C3-3906-6C42-A7D7-F818A643B30A}" type="datetimeFigureOut">
               <a:rPr lang="en-US" smtClean="0"/>
-              <a:t>7/13/25</a:t>
+              <a:t>7/15/25</a:t>
             </a:fld>
             <a:endParaRPr lang="en-US"/>
           </a:p>
@@ -676,7 +1112,7 @@
           <a:p>
             <a:fld id="{5C9C18C3-3906-6C42-A7D7-F818A643B30A}" type="datetimeFigureOut">
               <a:rPr lang="en-US" smtClean="0"/>
-              <a:t>7/13/25</a:t>
+              <a:t>7/15/25</a:t>
             </a:fld>
             <a:endParaRPr lang="en-US"/>
           </a:p>
@@ -874,7 +1310,7 @@
           <a:p>
             <a:fld id="{5C9C18C3-3906-6C42-A7D7-F818A643B30A}" type="datetimeFigureOut">
               <a:rPr lang="en-US" smtClean="0"/>
-              <a:t>7/13/25</a:t>
+              <a:t>7/15/25</a:t>
             </a:fld>
             <a:endParaRPr lang="en-US"/>
           </a:p>
@@ -1149,7 +1585,7 @@
           <a:p>
             <a:fld id="{5C9C18C3-3906-6C42-A7D7-F818A643B30A}" type="datetimeFigureOut">
               <a:rPr lang="en-US" smtClean="0"/>
-              <a:t>7/13/25</a:t>
+              <a:t>7/15/25</a:t>
             </a:fld>
             <a:endParaRPr lang="en-US"/>
           </a:p>
@@ -1414,7 +1850,7 @@
           <a:p>
             <a:fld id="{5C9C18C3-3906-6C42-A7D7-F818A643B30A}" type="datetimeFigureOut">
               <a:rPr lang="en-US" smtClean="0"/>
-              <a:t>7/13/25</a:t>
+              <a:t>7/15/25</a:t>
             </a:fld>
             <a:endParaRPr lang="en-US"/>
           </a:p>
@@ -1826,7 +2262,7 @@
           <a:p>
             <a:fld id="{5C9C18C3-3906-6C42-A7D7-F818A643B30A}" type="datetimeFigureOut">
               <a:rPr lang="en-US" smtClean="0"/>
-              <a:t>7/13/25</a:t>
+              <a:t>7/15/25</a:t>
             </a:fld>
             <a:endParaRPr lang="en-US"/>
           </a:p>
@@ -1967,7 +2403,7 @@
           <a:p>
             <a:fld id="{5C9C18C3-3906-6C42-A7D7-F818A643B30A}" type="datetimeFigureOut">
               <a:rPr lang="en-US" smtClean="0"/>
-              <a:t>7/13/25</a:t>
+              <a:t>7/15/25</a:t>
             </a:fld>
             <a:endParaRPr lang="en-US"/>
           </a:p>
@@ -2080,7 +2516,7 @@
           <a:p>
             <a:fld id="{5C9C18C3-3906-6C42-A7D7-F818A643B30A}" type="datetimeFigureOut">
               <a:rPr lang="en-US" smtClean="0"/>
-              <a:t>7/13/25</a:t>
+              <a:t>7/15/25</a:t>
             </a:fld>
             <a:endParaRPr lang="en-US"/>
           </a:p>
@@ -2391,7 +2827,7 @@
           <a:p>
             <a:fld id="{5C9C18C3-3906-6C42-A7D7-F818A643B30A}" type="datetimeFigureOut">
               <a:rPr lang="en-US" smtClean="0"/>
-              <a:t>7/13/25</a:t>
+              <a:t>7/15/25</a:t>
             </a:fld>
             <a:endParaRPr lang="en-US"/>
           </a:p>
@@ -2679,7 +3115,7 @@
           <a:p>
             <a:fld id="{5C9C18C3-3906-6C42-A7D7-F818A643B30A}" type="datetimeFigureOut">
               <a:rPr lang="en-US" smtClean="0"/>
-              <a:t>7/13/25</a:t>
+              <a:t>7/15/25</a:t>
             </a:fld>
             <a:endParaRPr lang="en-US"/>
           </a:p>
@@ -2920,7 +3356,7 @@
           <a:p>
             <a:fld id="{5C9C18C3-3906-6C42-A7D7-F818A643B30A}" type="datetimeFigureOut">
               <a:rPr lang="en-US" smtClean="0"/>
-              <a:t>7/13/25</a:t>
+              <a:t>7/15/25</a:t>
             </a:fld>
             <a:endParaRPr lang="en-US"/>
           </a:p>
@@ -3510,6 +3946,41 @@
           </a:p>
         </p:txBody>
       </p:sp>
+      <p:sp>
+        <p:nvSpPr>
+          <p:cNvPr id="4" name="TextBox 3">
+            <a:extLst>
+              <a:ext uri="{FF2B5EF4-FFF2-40B4-BE49-F238E27FC236}">
+                <a16:creationId xmlns:a16="http://schemas.microsoft.com/office/drawing/2014/main" id="{B8EE6E8F-F316-56CF-71FD-0BD59749D244}"/>
+              </a:ext>
+            </a:extLst>
+          </p:cNvPr>
+          <p:cNvSpPr txBox="1"/>
+          <p:nvPr/>
+        </p:nvSpPr>
+        <p:spPr>
+          <a:xfrm>
+            <a:off x="7196962" y="522328"/>
+            <a:ext cx="3543977" cy="369332"/>
+          </a:xfrm>
+          <a:prstGeom prst="rect">
+            <a:avLst/>
+          </a:prstGeom>
+          <a:noFill/>
+        </p:spPr>
+        <p:txBody>
+          <a:bodyPr wrap="square" rtlCol="0">
+            <a:spAutoFit/>
+          </a:bodyPr>
+          <a:lstStyle/>
+          <a:p>
+            <a:r>
+              <a:rPr lang="en-US" dirty="0"/>
+              <a:t>M-INTRO</a:t>
+            </a:r>
+          </a:p>
+        </p:txBody>
+      </p:sp>
     </p:spTree>
     <p:extLst>
       <p:ext uri="{BB962C8B-B14F-4D97-AF65-F5344CB8AC3E}">
@@ -4223,6 +4694,41 @@
           </a:p>
         </p:txBody>
       </p:sp>
+      <p:sp>
+        <p:nvSpPr>
+          <p:cNvPr id="6" name="TextBox 5">
+            <a:extLst>
+              <a:ext uri="{FF2B5EF4-FFF2-40B4-BE49-F238E27FC236}">
+                <a16:creationId xmlns:a16="http://schemas.microsoft.com/office/drawing/2014/main" id="{080BEC7F-8D32-6D9E-0809-CA6E2DA958EA}"/>
+              </a:ext>
+            </a:extLst>
+          </p:cNvPr>
+          <p:cNvSpPr txBox="1"/>
+          <p:nvPr/>
+        </p:nvSpPr>
+        <p:spPr>
+          <a:xfrm>
+            <a:off x="7456674" y="365125"/>
+            <a:ext cx="3543977" cy="369332"/>
+          </a:xfrm>
+          <a:prstGeom prst="rect">
+            <a:avLst/>
+          </a:prstGeom>
+          <a:noFill/>
+        </p:spPr>
+        <p:txBody>
+          <a:bodyPr wrap="square" rtlCol="0">
+            <a:spAutoFit/>
+          </a:bodyPr>
+          <a:lstStyle/>
+          <a:p>
+            <a:r>
+              <a:rPr lang="en-US" dirty="0"/>
+              <a:t>JOSH – EXPLAIN..</a:t>
+            </a:r>
+          </a:p>
+        </p:txBody>
+      </p:sp>
     </p:spTree>
     <p:extLst>
       <p:ext uri="{BB962C8B-B14F-4D97-AF65-F5344CB8AC3E}">
@@ -4844,6 +5350,41 @@
           </a:p>
         </p:txBody>
       </p:sp>
+      <p:sp>
+        <p:nvSpPr>
+          <p:cNvPr id="4" name="TextBox 3">
+            <a:extLst>
+              <a:ext uri="{FF2B5EF4-FFF2-40B4-BE49-F238E27FC236}">
+                <a16:creationId xmlns:a16="http://schemas.microsoft.com/office/drawing/2014/main" id="{D7E6A85A-DC31-07F6-FA7A-FC62BAA62482}"/>
+              </a:ext>
+            </a:extLst>
+          </p:cNvPr>
+          <p:cNvSpPr txBox="1"/>
+          <p:nvPr/>
+        </p:nvSpPr>
+        <p:spPr>
+          <a:xfrm>
+            <a:off x="7196962" y="522328"/>
+            <a:ext cx="3543977" cy="369332"/>
+          </a:xfrm>
+          <a:prstGeom prst="rect">
+            <a:avLst/>
+          </a:prstGeom>
+          <a:noFill/>
+        </p:spPr>
+        <p:txBody>
+          <a:bodyPr wrap="square" rtlCol="0">
+            <a:spAutoFit/>
+          </a:bodyPr>
+          <a:lstStyle/>
+          <a:p>
+            <a:r>
+              <a:rPr lang="en-US" dirty="0"/>
+              <a:t>M-PROBLEM</a:t>
+            </a:r>
+          </a:p>
+        </p:txBody>
+      </p:sp>
     </p:spTree>
     <p:extLst>
       <p:ext uri="{BB962C8B-B14F-4D97-AF65-F5344CB8AC3E}">
@@ -4865,7 +5406,7 @@
         <p:cNvPr id="1" name="">
           <a:extLst>
             <a:ext uri="{FF2B5EF4-FFF2-40B4-BE49-F238E27FC236}">
-              <a16:creationId xmlns:a16="http://schemas.microsoft.com/office/drawing/2014/main" id="{1246127A-C9B7-52E1-E436-96686C1B00C0}"/>
+              <a16:creationId xmlns:a16="http://schemas.microsoft.com/office/drawing/2014/main" id="{64002D55-3390-F153-9420-69FF125201E7}"/>
             </a:ext>
           </a:extLst>
         </p:cNvPr>
@@ -4885,7 +5426,7 @@
           <p:cNvPr id="2" name="Title 1">
             <a:extLst>
               <a:ext uri="{FF2B5EF4-FFF2-40B4-BE49-F238E27FC236}">
-                <a16:creationId xmlns:a16="http://schemas.microsoft.com/office/drawing/2014/main" id="{1F57782D-6FE8-C6B0-26D9-AA629AB8E8D0}"/>
+                <a16:creationId xmlns:a16="http://schemas.microsoft.com/office/drawing/2014/main" id="{905C41E4-8491-29CA-48B2-23F194AF27E7}"/>
               </a:ext>
             </a:extLst>
           </p:cNvPr>
@@ -4917,7 +5458,7 @@
           <p:cNvPr id="5" name="Rectangle 4">
             <a:extLst>
               <a:ext uri="{FF2B5EF4-FFF2-40B4-BE49-F238E27FC236}">
-                <a16:creationId xmlns:a16="http://schemas.microsoft.com/office/drawing/2014/main" id="{24CC4190-2199-4DE0-51EF-F7E28744EDA7}"/>
+                <a16:creationId xmlns:a16="http://schemas.microsoft.com/office/drawing/2014/main" id="{D125F3AA-2A4E-53E2-7A2A-CB326909A706}"/>
               </a:ext>
             </a:extLst>
           </p:cNvPr>
@@ -4971,7 +5512,7 @@
           <p:cNvPr id="4" name="TextBox 3">
             <a:extLst>
               <a:ext uri="{FF2B5EF4-FFF2-40B4-BE49-F238E27FC236}">
-                <a16:creationId xmlns:a16="http://schemas.microsoft.com/office/drawing/2014/main" id="{94C1D721-967C-CF35-2EA7-0F66BC24A988}"/>
+                <a16:creationId xmlns:a16="http://schemas.microsoft.com/office/drawing/2014/main" id="{91641F78-7057-41F3-A796-21DCDCA6E470}"/>
               </a:ext>
             </a:extLst>
           </p:cNvPr>
@@ -5006,57 +5547,12 @@
           </a:p>
         </p:txBody>
       </p:sp>
-      <p:sp>
-        <p:nvSpPr>
-          <p:cNvPr id="15" name="AutoShape 2" descr="Output image">
-            <a:extLst>
-              <a:ext uri="{FF2B5EF4-FFF2-40B4-BE49-F238E27FC236}">
-                <a16:creationId xmlns:a16="http://schemas.microsoft.com/office/drawing/2014/main" id="{363F246E-CA8C-07A0-96EF-E58C52DB2BB6}"/>
-              </a:ext>
-            </a:extLst>
-          </p:cNvPr>
-          <p:cNvSpPr>
-            <a:spLocks noChangeAspect="1" noChangeArrowheads="1"/>
-          </p:cNvSpPr>
-          <p:nvPr/>
-        </p:nvSpPr>
-        <p:spPr bwMode="auto">
-          <a:xfrm>
-            <a:off x="5943600" y="3276600"/>
-            <a:ext cx="304800" cy="304800"/>
-          </a:xfrm>
-          <a:prstGeom prst="rect">
-            <a:avLst/>
-          </a:prstGeom>
-          <a:noFill/>
-          <a:extLst>
-            <a:ext uri="{909E8E84-426E-40DD-AFC4-6F175D3DCCD1}">
-              <a14:hiddenFill xmlns:a14="http://schemas.microsoft.com/office/drawing/2010/main">
-                <a:solidFill>
-                  <a:srgbClr val="FFFFFF"/>
-                </a:solidFill>
-              </a14:hiddenFill>
-            </a:ext>
-          </a:extLst>
-        </p:spPr>
-        <p:txBody>
-          <a:bodyPr vert="horz" wrap="square" lIns="91440" tIns="45720" rIns="91440" bIns="45720" numCol="1" anchor="t" anchorCtr="0" compatLnSpc="1">
-            <a:prstTxWarp prst="textNoShape">
-              <a:avLst/>
-            </a:prstTxWarp>
-          </a:bodyPr>
-          <a:lstStyle/>
-          <a:p>
-            <a:endParaRPr lang="en-US"/>
-          </a:p>
-        </p:txBody>
-      </p:sp>
       <p:pic>
         <p:nvPicPr>
-          <p:cNvPr id="17" name="Picture 16">
-            <a:extLst>
-              <a:ext uri="{FF2B5EF4-FFF2-40B4-BE49-F238E27FC236}">
-                <a16:creationId xmlns:a16="http://schemas.microsoft.com/office/drawing/2014/main" id="{E0F40332-86C2-BDD5-36E2-A83A2FA39072}"/>
+          <p:cNvPr id="3" name="Picture 2">
+            <a:extLst>
+              <a:ext uri="{FF2B5EF4-FFF2-40B4-BE49-F238E27FC236}">
+                <a16:creationId xmlns:a16="http://schemas.microsoft.com/office/drawing/2014/main" id="{3C7F595E-F01E-F876-37F1-D7E98C665403}"/>
               </a:ext>
             </a:extLst>
           </p:cNvPr>
@@ -5066,25 +5562,109 @@
           <p:nvPr/>
         </p:nvPicPr>
         <p:blipFill>
-          <a:blip r:embed="rId2"/>
+          <a:blip r:embed="rId3"/>
+          <a:srcRect t="12500"/>
           <a:stretch>
             <a:fillRect/>
           </a:stretch>
         </p:blipFill>
         <p:spPr>
           <a:xfrm>
-            <a:off x="1220585" y="1366512"/>
-            <a:ext cx="8818918" cy="5261032"/>
+            <a:off x="7515691" y="2875621"/>
+            <a:ext cx="3572538" cy="2945624"/>
           </a:xfrm>
           <a:prstGeom prst="rect">
             <a:avLst/>
           </a:prstGeom>
         </p:spPr>
       </p:pic>
+      <p:sp>
+        <p:nvSpPr>
+          <p:cNvPr id="11" name="TextBox 10">
+            <a:extLst>
+              <a:ext uri="{FF2B5EF4-FFF2-40B4-BE49-F238E27FC236}">
+                <a16:creationId xmlns:a16="http://schemas.microsoft.com/office/drawing/2014/main" id="{7AE285F5-108F-C31F-7993-57CBCEA5190A}"/>
+              </a:ext>
+            </a:extLst>
+          </p:cNvPr>
+          <p:cNvSpPr txBox="1"/>
+          <p:nvPr/>
+        </p:nvSpPr>
+        <p:spPr>
+          <a:xfrm>
+            <a:off x="915752" y="2093625"/>
+            <a:ext cx="2557885" cy="584775"/>
+          </a:xfrm>
+          <a:prstGeom prst="rect">
+            <a:avLst/>
+          </a:prstGeom>
+          <a:noFill/>
+        </p:spPr>
+        <p:txBody>
+          <a:bodyPr wrap="square">
+            <a:spAutoFit/>
+          </a:bodyPr>
+          <a:lstStyle/>
+          <a:p>
+            <a:r>
+              <a:rPr lang="en-US" sz="3200" b="1" dirty="0">
+                <a:solidFill>
+                  <a:schemeClr val="accent1">
+                    <a:lumMod val="75000"/>
+                  </a:schemeClr>
+                </a:solidFill>
+              </a:rPr>
+              <a:t>AGE MIN</a:t>
+            </a:r>
+            <a:endParaRPr lang="en-US" sz="3200" dirty="0">
+              <a:solidFill>
+                <a:schemeClr val="accent1">
+                  <a:lumMod val="75000"/>
+                </a:schemeClr>
+              </a:solidFill>
+            </a:endParaRPr>
+          </a:p>
+        </p:txBody>
+      </p:sp>
+      <p:sp>
+        <p:nvSpPr>
+          <p:cNvPr id="12" name="TextBox 11">
+            <a:extLst>
+              <a:ext uri="{FF2B5EF4-FFF2-40B4-BE49-F238E27FC236}">
+                <a16:creationId xmlns:a16="http://schemas.microsoft.com/office/drawing/2014/main" id="{FACF54AA-775D-3894-A01F-6119F779B9E1}"/>
+              </a:ext>
+            </a:extLst>
+          </p:cNvPr>
+          <p:cNvSpPr txBox="1"/>
+          <p:nvPr/>
+        </p:nvSpPr>
+        <p:spPr>
+          <a:xfrm>
+            <a:off x="7196962" y="522328"/>
+            <a:ext cx="3543977" cy="369332"/>
+          </a:xfrm>
+          <a:prstGeom prst="rect">
+            <a:avLst/>
+          </a:prstGeom>
+          <a:noFill/>
+        </p:spPr>
+        <p:txBody>
+          <a:bodyPr wrap="square" rtlCol="0">
+            <a:spAutoFit/>
+          </a:bodyPr>
+          <a:lstStyle/>
+          <a:p>
+            <a:r>
+              <a:rPr lang="en-US" dirty="0"/>
+              <a:t>M-PROBLEM</a:t>
+            </a:r>
+          </a:p>
+        </p:txBody>
+      </p:sp>
     </p:spTree>
     <p:extLst>
       <p:ext uri="{BB962C8B-B14F-4D97-AF65-F5344CB8AC3E}">
-        <p14:creationId xmlns:p14="http://schemas.microsoft.com/office/powerpoint/2010/main" val="1115525068"/>
+        <p14:creationId xmlns:p14="http://schemas.microsoft.com/office/powerpoint/2010/main" val="2292886490"/>
       </p:ext>
     </p:extLst>
   </p:cSld>
@@ -5276,13 +5856,104 @@
             </a:pPr>
             <a:endParaRPr lang="en-US" sz="2000" i="1" dirty="0"/>
           </a:p>
-          <a:p>
-            <a:pPr marL="0" indent="0" algn="l">
-              <a:buNone/>
-            </a:pPr>
-            <a:r>
-              <a:rPr lang="en-US" sz="2400" i="1" dirty="0"/>
-              <a:t>??</a:t>
+        </p:txBody>
+      </p:sp>
+      <p:sp>
+        <p:nvSpPr>
+          <p:cNvPr id="6" name="TextBox 5">
+            <a:extLst>
+              <a:ext uri="{FF2B5EF4-FFF2-40B4-BE49-F238E27FC236}">
+                <a16:creationId xmlns:a16="http://schemas.microsoft.com/office/drawing/2014/main" id="{74874A00-1717-BE03-1732-F3618178919A}"/>
+              </a:ext>
+            </a:extLst>
+          </p:cNvPr>
+          <p:cNvSpPr txBox="1"/>
+          <p:nvPr/>
+        </p:nvSpPr>
+        <p:spPr>
+          <a:xfrm>
+            <a:off x="7688594" y="496371"/>
+            <a:ext cx="3543977" cy="369332"/>
+          </a:xfrm>
+          <a:prstGeom prst="rect">
+            <a:avLst/>
+          </a:prstGeom>
+          <a:noFill/>
+        </p:spPr>
+        <p:txBody>
+          <a:bodyPr wrap="square" rtlCol="0">
+            <a:spAutoFit/>
+          </a:bodyPr>
+          <a:lstStyle/>
+          <a:p>
+            <a:r>
+              <a:rPr lang="en-US" dirty="0"/>
+              <a:t>RESEARCH</a:t>
+            </a:r>
+          </a:p>
+        </p:txBody>
+      </p:sp>
+      <p:pic>
+        <p:nvPicPr>
+          <p:cNvPr id="7" name="Picture 6">
+            <a:extLst>
+              <a:ext uri="{FF2B5EF4-FFF2-40B4-BE49-F238E27FC236}">
+                <a16:creationId xmlns:a16="http://schemas.microsoft.com/office/drawing/2014/main" id="{54EC514C-5E3D-4DE7-A8AE-FFA94743DA38}"/>
+              </a:ext>
+            </a:extLst>
+          </p:cNvPr>
+          <p:cNvPicPr>
+            <a:picLocks noChangeAspect="1"/>
+          </p:cNvPicPr>
+          <p:nvPr/>
+        </p:nvPicPr>
+        <p:blipFill>
+          <a:blip r:embed="rId2"/>
+          <a:stretch>
+            <a:fillRect/>
+          </a:stretch>
+        </p:blipFill>
+        <p:spPr>
+          <a:xfrm>
+            <a:off x="8146661" y="4177022"/>
+            <a:ext cx="3779211" cy="2254534"/>
+          </a:xfrm>
+          <a:prstGeom prst="rect">
+            <a:avLst/>
+          </a:prstGeom>
+        </p:spPr>
+      </p:pic>
+      <p:sp>
+        <p:nvSpPr>
+          <p:cNvPr id="8" name="TextBox 7">
+            <a:extLst>
+              <a:ext uri="{FF2B5EF4-FFF2-40B4-BE49-F238E27FC236}">
+                <a16:creationId xmlns:a16="http://schemas.microsoft.com/office/drawing/2014/main" id="{99392ABB-634C-B5AB-6CF5-0D663E574D3E}"/>
+              </a:ext>
+            </a:extLst>
+          </p:cNvPr>
+          <p:cNvSpPr txBox="1"/>
+          <p:nvPr/>
+        </p:nvSpPr>
+        <p:spPr>
+          <a:xfrm>
+            <a:off x="7440442" y="859442"/>
+            <a:ext cx="3543977" cy="369332"/>
+          </a:xfrm>
+          <a:prstGeom prst="rect">
+            <a:avLst/>
+          </a:prstGeom>
+          <a:noFill/>
+        </p:spPr>
+        <p:txBody>
+          <a:bodyPr wrap="square" rtlCol="0">
+            <a:spAutoFit/>
+          </a:bodyPr>
+          <a:lstStyle/>
+          <a:p>
+            <a:r>
+              <a:rPr lang="en-US" dirty="0"/>
+              <a:t>M-PROBLEM</a:t>
             </a:r>
           </a:p>
         </p:txBody>
@@ -5542,6 +6213,41 @@
           </a:prstGeom>
         </p:spPr>
       </p:pic>
+      <p:sp>
+        <p:nvSpPr>
+          <p:cNvPr id="4" name="TextBox 3">
+            <a:extLst>
+              <a:ext uri="{FF2B5EF4-FFF2-40B4-BE49-F238E27FC236}">
+                <a16:creationId xmlns:a16="http://schemas.microsoft.com/office/drawing/2014/main" id="{BD084F9B-C160-2C64-527C-938A36038311}"/>
+              </a:ext>
+            </a:extLst>
+          </p:cNvPr>
+          <p:cNvSpPr txBox="1"/>
+          <p:nvPr/>
+        </p:nvSpPr>
+        <p:spPr>
+          <a:xfrm>
+            <a:off x="7440442" y="859442"/>
+            <a:ext cx="3543977" cy="369332"/>
+          </a:xfrm>
+          <a:prstGeom prst="rect">
+            <a:avLst/>
+          </a:prstGeom>
+          <a:noFill/>
+        </p:spPr>
+        <p:txBody>
+          <a:bodyPr wrap="square" rtlCol="0">
+            <a:spAutoFit/>
+          </a:bodyPr>
+          <a:lstStyle/>
+          <a:p>
+            <a:r>
+              <a:rPr lang="en-US" dirty="0"/>
+              <a:t>JOSH – EXPLAIN..</a:t>
+            </a:r>
+          </a:p>
+        </p:txBody>
+      </p:sp>
     </p:spTree>
     <p:extLst>
       <p:ext uri="{BB962C8B-B14F-4D97-AF65-F5344CB8AC3E}">
@@ -5744,6 +6450,87 @@
             <a:r>
               <a:rPr lang="en-US" sz="2400" i="1" dirty="0"/>
               <a:t>??</a:t>
+            </a:r>
+          </a:p>
+        </p:txBody>
+      </p:sp>
+      <p:sp>
+        <p:nvSpPr>
+          <p:cNvPr id="3" name="Rectangle 2">
+            <a:extLst>
+              <a:ext uri="{FF2B5EF4-FFF2-40B4-BE49-F238E27FC236}">
+                <a16:creationId xmlns:a16="http://schemas.microsoft.com/office/drawing/2014/main" id="{30B770B2-559D-587C-BB7A-5CD54F21EC62}"/>
+              </a:ext>
+            </a:extLst>
+          </p:cNvPr>
+          <p:cNvSpPr/>
+          <p:nvPr/>
+        </p:nvSpPr>
+        <p:spPr>
+          <a:xfrm>
+            <a:off x="2651219" y="2153439"/>
+            <a:ext cx="1390538" cy="1114594"/>
+          </a:xfrm>
+          <a:prstGeom prst="rect">
+            <a:avLst/>
+          </a:prstGeom>
+        </p:spPr>
+        <p:style>
+          <a:lnRef idx="2">
+            <a:schemeClr val="accent1">
+              <a:shade val="15000"/>
+            </a:schemeClr>
+          </a:lnRef>
+          <a:fillRef idx="1">
+            <a:schemeClr val="accent1"/>
+          </a:fillRef>
+          <a:effectRef idx="0">
+            <a:schemeClr val="accent1"/>
+          </a:effectRef>
+          <a:fontRef idx="minor">
+            <a:schemeClr val="lt1"/>
+          </a:fontRef>
+        </p:style>
+        <p:txBody>
+          <a:bodyPr rtlCol="0" anchor="ctr"/>
+          <a:lstStyle/>
+          <a:p>
+            <a:pPr algn="ctr"/>
+            <a:endParaRPr lang="en-US"/>
+          </a:p>
+        </p:txBody>
+      </p:sp>
+      <p:sp>
+        <p:nvSpPr>
+          <p:cNvPr id="4" name="TextBox 3">
+            <a:extLst>
+              <a:ext uri="{FF2B5EF4-FFF2-40B4-BE49-F238E27FC236}">
+                <a16:creationId xmlns:a16="http://schemas.microsoft.com/office/drawing/2014/main" id="{3098321E-89AB-4F87-6D79-8EA96A27D1AF}"/>
+              </a:ext>
+            </a:extLst>
+          </p:cNvPr>
+          <p:cNvSpPr txBox="1"/>
+          <p:nvPr/>
+        </p:nvSpPr>
+        <p:spPr>
+          <a:xfrm>
+            <a:off x="5167969" y="2828919"/>
+            <a:ext cx="3543977" cy="369332"/>
+          </a:xfrm>
+          <a:prstGeom prst="rect">
+            <a:avLst/>
+          </a:prstGeom>
+          <a:noFill/>
+        </p:spPr>
+        <p:txBody>
+          <a:bodyPr wrap="square" rtlCol="0">
+            <a:spAutoFit/>
+          </a:bodyPr>
+          <a:lstStyle/>
+          <a:p>
+            <a:r>
+              <a:rPr lang="en-US" dirty="0"/>
+              <a:t>JOSH - FLOW</a:t>
             </a:r>
           </a:p>
         </p:txBody>
@@ -6143,10 +6930,10 @@
                         <a:buNone/>
                       </a:pPr>
                       <a:r>
-                        <a:rPr lang="en-US" b="1"/>
+                        <a:rPr lang="en-US" b="1" dirty="0"/>
                         <a:t>Support compliance</a:t>
                       </a:r>
-                      <a:endParaRPr lang="en-US"/>
+                      <a:endParaRPr lang="en-US" dirty="0"/>
                     </a:p>
                   </a:txBody>
                   <a:tcPr anchor="ctr">
@@ -6361,6 +7148,41 @@
                 </a:solidFill>
               </a:rPr>
               <a:t>SIM</a:t>
+            </a:r>
+          </a:p>
+        </p:txBody>
+      </p:sp>
+      <p:sp>
+        <p:nvSpPr>
+          <p:cNvPr id="4" name="TextBox 3">
+            <a:extLst>
+              <a:ext uri="{FF2B5EF4-FFF2-40B4-BE49-F238E27FC236}">
+                <a16:creationId xmlns:a16="http://schemas.microsoft.com/office/drawing/2014/main" id="{233B31AC-A050-D641-7A85-A55523C7D819}"/>
+              </a:ext>
+            </a:extLst>
+          </p:cNvPr>
+          <p:cNvSpPr txBox="1"/>
+          <p:nvPr/>
+        </p:nvSpPr>
+        <p:spPr>
+          <a:xfrm>
+            <a:off x="7753019" y="1364481"/>
+            <a:ext cx="3543977" cy="369332"/>
+          </a:xfrm>
+          <a:prstGeom prst="rect">
+            <a:avLst/>
+          </a:prstGeom>
+          <a:noFill/>
+        </p:spPr>
+        <p:txBody>
+          <a:bodyPr wrap="square" rtlCol="0">
+            <a:spAutoFit/>
+          </a:bodyPr>
+          <a:lstStyle/>
+          <a:p>
+            <a:r>
+              <a:rPr lang="en-US" dirty="0"/>
+              <a:t>JOSH – EXPLAIN..</a:t>
             </a:r>
           </a:p>
         </p:txBody>
@@ -6564,6 +7386,176 @@
           </a:p>
         </p:txBody>
       </p:sp>
+      <p:sp>
+        <p:nvSpPr>
+          <p:cNvPr id="5" name="AutoShape 2" descr="Output image">
+            <a:extLst>
+              <a:ext uri="{FF2B5EF4-FFF2-40B4-BE49-F238E27FC236}">
+                <a16:creationId xmlns:a16="http://schemas.microsoft.com/office/drawing/2014/main" id="{E28A4EDB-E04A-1850-2992-1033F995B637}"/>
+              </a:ext>
+            </a:extLst>
+          </p:cNvPr>
+          <p:cNvSpPr>
+            <a:spLocks noChangeAspect="1" noChangeArrowheads="1"/>
+          </p:cNvSpPr>
+          <p:nvPr/>
+        </p:nvSpPr>
+        <p:spPr bwMode="auto">
+          <a:xfrm>
+            <a:off x="5943600" y="3276600"/>
+            <a:ext cx="304800" cy="304800"/>
+          </a:xfrm>
+          <a:prstGeom prst="rect">
+            <a:avLst/>
+          </a:prstGeom>
+          <a:noFill/>
+          <a:extLst>
+            <a:ext uri="{909E8E84-426E-40DD-AFC4-6F175D3DCCD1}">
+              <a14:hiddenFill xmlns:a14="http://schemas.microsoft.com/office/drawing/2010/main">
+                <a:solidFill>
+                  <a:srgbClr val="FFFFFF"/>
+                </a:solidFill>
+              </a14:hiddenFill>
+            </a:ext>
+          </a:extLst>
+        </p:spPr>
+        <p:txBody>
+          <a:bodyPr vert="horz" wrap="square" lIns="91440" tIns="45720" rIns="91440" bIns="45720" numCol="1" anchor="t" anchorCtr="0" compatLnSpc="1">
+            <a:prstTxWarp prst="textNoShape">
+              <a:avLst/>
+            </a:prstTxWarp>
+          </a:bodyPr>
+          <a:lstStyle/>
+          <a:p>
+            <a:endParaRPr lang="en-US"/>
+          </a:p>
+        </p:txBody>
+      </p:sp>
+      <p:pic>
+        <p:nvPicPr>
+          <p:cNvPr id="7" name="Picture 6">
+            <a:extLst>
+              <a:ext uri="{FF2B5EF4-FFF2-40B4-BE49-F238E27FC236}">
+                <a16:creationId xmlns:a16="http://schemas.microsoft.com/office/drawing/2014/main" id="{6F43E06D-4B1A-C2DE-2B59-9B08F5D05723}"/>
+              </a:ext>
+            </a:extLst>
+          </p:cNvPr>
+          <p:cNvPicPr>
+            <a:picLocks noChangeAspect="1"/>
+          </p:cNvPicPr>
+          <p:nvPr/>
+        </p:nvPicPr>
+        <p:blipFill>
+          <a:blip r:embed="rId2"/>
+          <a:stretch>
+            <a:fillRect/>
+          </a:stretch>
+        </p:blipFill>
+        <p:spPr>
+          <a:xfrm>
+            <a:off x="947560" y="1690688"/>
+            <a:ext cx="3403156" cy="3310266"/>
+          </a:xfrm>
+          <a:prstGeom prst="rect">
+            <a:avLst/>
+          </a:prstGeom>
+        </p:spPr>
+      </p:pic>
+      <p:pic>
+        <p:nvPicPr>
+          <p:cNvPr id="8" name="Picture 7">
+            <a:extLst>
+              <a:ext uri="{FF2B5EF4-FFF2-40B4-BE49-F238E27FC236}">
+                <a16:creationId xmlns:a16="http://schemas.microsoft.com/office/drawing/2014/main" id="{1E914743-3704-7229-3BEA-C12B6B4D96E0}"/>
+              </a:ext>
+            </a:extLst>
+          </p:cNvPr>
+          <p:cNvPicPr>
+            <a:picLocks noChangeAspect="1"/>
+          </p:cNvPicPr>
+          <p:nvPr/>
+        </p:nvPicPr>
+        <p:blipFill>
+          <a:blip r:embed="rId3"/>
+          <a:stretch>
+            <a:fillRect/>
+          </a:stretch>
+        </p:blipFill>
+        <p:spPr>
+          <a:xfrm>
+            <a:off x="4393573" y="1606548"/>
+            <a:ext cx="3469783" cy="3478545"/>
+          </a:xfrm>
+          <a:prstGeom prst="rect">
+            <a:avLst/>
+          </a:prstGeom>
+        </p:spPr>
+      </p:pic>
+      <p:pic>
+        <p:nvPicPr>
+          <p:cNvPr id="9" name="Picture 8">
+            <a:extLst>
+              <a:ext uri="{FF2B5EF4-FFF2-40B4-BE49-F238E27FC236}">
+                <a16:creationId xmlns:a16="http://schemas.microsoft.com/office/drawing/2014/main" id="{4921AC54-DF87-F17D-590E-C5CB1AB22FFB}"/>
+              </a:ext>
+            </a:extLst>
+          </p:cNvPr>
+          <p:cNvPicPr>
+            <a:picLocks noChangeAspect="1"/>
+          </p:cNvPicPr>
+          <p:nvPr/>
+        </p:nvPicPr>
+        <p:blipFill>
+          <a:blip r:embed="rId4"/>
+          <a:stretch>
+            <a:fillRect/>
+          </a:stretch>
+        </p:blipFill>
+        <p:spPr>
+          <a:xfrm>
+            <a:off x="7989625" y="1606548"/>
+            <a:ext cx="3237906" cy="3189579"/>
+          </a:xfrm>
+          <a:prstGeom prst="rect">
+            <a:avLst/>
+          </a:prstGeom>
+        </p:spPr>
+      </p:pic>
+      <p:sp>
+        <p:nvSpPr>
+          <p:cNvPr id="10" name="TextBox 9">
+            <a:extLst>
+              <a:ext uri="{FF2B5EF4-FFF2-40B4-BE49-F238E27FC236}">
+                <a16:creationId xmlns:a16="http://schemas.microsoft.com/office/drawing/2014/main" id="{1A0939D5-61CF-FC53-C681-E8A9B39521DD}"/>
+              </a:ext>
+            </a:extLst>
+          </p:cNvPr>
+          <p:cNvSpPr txBox="1"/>
+          <p:nvPr/>
+        </p:nvSpPr>
+        <p:spPr>
+          <a:xfrm>
+            <a:off x="7257724" y="801171"/>
+            <a:ext cx="3543977" cy="369332"/>
+          </a:xfrm>
+          <a:prstGeom prst="rect">
+            <a:avLst/>
+          </a:prstGeom>
+          <a:noFill/>
+        </p:spPr>
+        <p:txBody>
+          <a:bodyPr wrap="square" rtlCol="0">
+            <a:spAutoFit/>
+          </a:bodyPr>
+          <a:lstStyle/>
+          <a:p>
+            <a:r>
+              <a:rPr lang="en-US" dirty="0"/>
+              <a:t>JOSH – EXPLAIN..</a:t>
+            </a:r>
+          </a:p>
+        </p:txBody>
+      </p:sp>
     </p:spTree>
     <p:extLst>
       <p:ext uri="{BB962C8B-B14F-4D97-AF65-F5344CB8AC3E}">
@@ -6759,6 +7751,41 @@
                 </a:solidFill>
               </a:rPr>
               <a:t>INSIGHT</a:t>
+            </a:r>
+          </a:p>
+        </p:txBody>
+      </p:sp>
+      <p:sp>
+        <p:nvSpPr>
+          <p:cNvPr id="4" name="TextBox 3">
+            <a:extLst>
+              <a:ext uri="{FF2B5EF4-FFF2-40B4-BE49-F238E27FC236}">
+                <a16:creationId xmlns:a16="http://schemas.microsoft.com/office/drawing/2014/main" id="{CA216034-78F9-31DD-F074-E69A05C6C8CF}"/>
+              </a:ext>
+            </a:extLst>
+          </p:cNvPr>
+          <p:cNvSpPr txBox="1"/>
+          <p:nvPr/>
+        </p:nvSpPr>
+        <p:spPr>
+          <a:xfrm>
+            <a:off x="7440442" y="859442"/>
+            <a:ext cx="3543977" cy="369332"/>
+          </a:xfrm>
+          <a:prstGeom prst="rect">
+            <a:avLst/>
+          </a:prstGeom>
+          <a:noFill/>
+        </p:spPr>
+        <p:txBody>
+          <a:bodyPr wrap="square" rtlCol="0">
+            <a:spAutoFit/>
+          </a:bodyPr>
+          <a:lstStyle/>
+          <a:p>
+            <a:r>
+              <a:rPr lang="en-US" dirty="0"/>
+              <a:t>M – EXPLAIN..</a:t>
             </a:r>
           </a:p>
         </p:txBody>
@@ -7089,4 +8116,319 @@
     </a:ext>
   </a:extLst>
 </a:theme>
+</file>
+
+<file path=ppt/theme/theme2.xml><?xml version="1.0" encoding="utf-8"?>
+<a:theme xmlns:a="http://schemas.openxmlformats.org/drawingml/2006/main" name="Office Theme">
+  <a:themeElements>
+    <a:clrScheme name="Office">
+      <a:dk1>
+        <a:sysClr val="windowText" lastClr="000000"/>
+      </a:dk1>
+      <a:lt1>
+        <a:sysClr val="window" lastClr="FFFFFF"/>
+      </a:lt1>
+      <a:dk2>
+        <a:srgbClr val="0E2841"/>
+      </a:dk2>
+      <a:lt2>
+        <a:srgbClr val="E8E8E8"/>
+      </a:lt2>
+      <a:accent1>
+        <a:srgbClr val="156082"/>
+      </a:accent1>
+      <a:accent2>
+        <a:srgbClr val="E97132"/>
+      </a:accent2>
+      <a:accent3>
+        <a:srgbClr val="196B24"/>
+      </a:accent3>
+      <a:accent4>
+        <a:srgbClr val="0F9ED5"/>
+      </a:accent4>
+      <a:accent5>
+        <a:srgbClr val="A02B93"/>
+      </a:accent5>
+      <a:accent6>
+        <a:srgbClr val="4EA72E"/>
+      </a:accent6>
+      <a:hlink>
+        <a:srgbClr val="467886"/>
+      </a:hlink>
+      <a:folHlink>
+        <a:srgbClr val="96607D"/>
+      </a:folHlink>
+    </a:clrScheme>
+    <a:fontScheme name="Office">
+      <a:majorFont>
+        <a:latin typeface="Aptos Display" panose="02110004020202020204"/>
+        <a:ea typeface=""/>
+        <a:cs typeface=""/>
+        <a:font script="Jpan" typeface="游ゴシック Light"/>
+        <a:font script="Hang" typeface="맑은 고딕"/>
+        <a:font script="Hans" typeface="等线 Light"/>
+        <a:font script="Hant" typeface="新細明體"/>
+        <a:font script="Arab" typeface="Times New Roman"/>
+        <a:font script="Hebr" typeface="Times New Roman"/>
+        <a:font script="Thai" typeface="Angsana New"/>
+        <a:font script="Ethi" typeface="Nyala"/>
+        <a:font script="Beng" typeface="Vrinda"/>
+        <a:font script="Gujr" typeface="Shruti"/>
+        <a:font script="Khmr" typeface="MoolBoran"/>
+        <a:font script="Knda" typeface="Tunga"/>
+        <a:font script="Guru" typeface="Raavi"/>
+        <a:font script="Cans" typeface="Euphemia"/>
+        <a:font script="Cher" typeface="Plantagenet Cherokee"/>
+        <a:font script="Yiii" typeface="Microsoft Yi Baiti"/>
+        <a:font script="Tibt" typeface="Microsoft Himalaya"/>
+        <a:font script="Thaa" typeface="MV Boli"/>
+        <a:font script="Deva" typeface="Mangal"/>
+        <a:font script="Telu" typeface="Gautami"/>
+        <a:font script="Taml" typeface="Latha"/>
+        <a:font script="Syrc" typeface="Estrangelo Edessa"/>
+        <a:font script="Orya" typeface="Kalinga"/>
+        <a:font script="Mlym" typeface="Kartika"/>
+        <a:font script="Laoo" typeface="DokChampa"/>
+        <a:font script="Sinh" typeface="Iskoola Pota"/>
+        <a:font script="Mong" typeface="Mongolian Baiti"/>
+        <a:font script="Viet" typeface="Times New Roman"/>
+        <a:font script="Uigh" typeface="Microsoft Uighur"/>
+        <a:font script="Geor" typeface="Sylfaen"/>
+        <a:font script="Armn" typeface="Arial"/>
+        <a:font script="Bugi" typeface="Leelawadee UI"/>
+        <a:font script="Bopo" typeface="Microsoft JhengHei"/>
+        <a:font script="Java" typeface="Javanese Text"/>
+        <a:font script="Lisu" typeface="Segoe UI"/>
+        <a:font script="Mymr" typeface="Myanmar Text"/>
+        <a:font script="Nkoo" typeface="Ebrima"/>
+        <a:font script="Olck" typeface="Nirmala UI"/>
+        <a:font script="Osma" typeface="Ebrima"/>
+        <a:font script="Phag" typeface="Phagspa"/>
+        <a:font script="Syrn" typeface="Estrangelo Edessa"/>
+        <a:font script="Syrj" typeface="Estrangelo Edessa"/>
+        <a:font script="Syre" typeface="Estrangelo Edessa"/>
+        <a:font script="Sora" typeface="Nirmala UI"/>
+        <a:font script="Tale" typeface="Microsoft Tai Le"/>
+        <a:font script="Talu" typeface="Microsoft New Tai Lue"/>
+        <a:font script="Tfng" typeface="Ebrima"/>
+      </a:majorFont>
+      <a:minorFont>
+        <a:latin typeface="Aptos" panose="02110004020202020204"/>
+        <a:ea typeface=""/>
+        <a:cs typeface=""/>
+        <a:font script="Jpan" typeface="游ゴシック"/>
+        <a:font script="Hang" typeface="맑은 고딕"/>
+        <a:font script="Hans" typeface="等线"/>
+        <a:font script="Hant" typeface="新細明體"/>
+        <a:font script="Arab" typeface="Arial"/>
+        <a:font script="Hebr" typeface="Arial"/>
+        <a:font script="Thai" typeface="Cordia New"/>
+        <a:font script="Ethi" typeface="Nyala"/>
+        <a:font script="Beng" typeface="Vrinda"/>
+        <a:font script="Gujr" typeface="Shruti"/>
+        <a:font script="Khmr" typeface="DaunPenh"/>
+        <a:font script="Knda" typeface="Tunga"/>
+        <a:font script="Guru" typeface="Raavi"/>
+        <a:font script="Cans" typeface="Euphemia"/>
+        <a:font script="Cher" typeface="Plantagenet Cherokee"/>
+        <a:font script="Yiii" typeface="Microsoft Yi Baiti"/>
+        <a:font script="Tibt" typeface="Microsoft Himalaya"/>
+        <a:font script="Thaa" typeface="MV Boli"/>
+        <a:font script="Deva" typeface="Mangal"/>
+        <a:font script="Telu" typeface="Gautami"/>
+        <a:font script="Taml" typeface="Latha"/>
+        <a:font script="Syrc" typeface="Estrangelo Edessa"/>
+        <a:font script="Orya" typeface="Kalinga"/>
+        <a:font script="Mlym" typeface="Kartika"/>
+        <a:font script="Laoo" typeface="DokChampa"/>
+        <a:font script="Sinh" typeface="Iskoola Pota"/>
+        <a:font script="Mong" typeface="Mongolian Baiti"/>
+        <a:font script="Viet" typeface="Arial"/>
+        <a:font script="Uigh" typeface="Microsoft Uighur"/>
+        <a:font script="Geor" typeface="Sylfaen"/>
+        <a:font script="Armn" typeface="Arial"/>
+        <a:font script="Bugi" typeface="Leelawadee UI"/>
+        <a:font script="Bopo" typeface="Microsoft JhengHei"/>
+        <a:font script="Java" typeface="Javanese Text"/>
+        <a:font script="Lisu" typeface="Segoe UI"/>
+        <a:font script="Mymr" typeface="Myanmar Text"/>
+        <a:font script="Nkoo" typeface="Ebrima"/>
+        <a:font script="Olck" typeface="Nirmala UI"/>
+        <a:font script="Osma" typeface="Ebrima"/>
+        <a:font script="Phag" typeface="Phagspa"/>
+        <a:font script="Syrn" typeface="Estrangelo Edessa"/>
+        <a:font script="Syrj" typeface="Estrangelo Edessa"/>
+        <a:font script="Syre" typeface="Estrangelo Edessa"/>
+        <a:font script="Sora" typeface="Nirmala UI"/>
+        <a:font script="Tale" typeface="Microsoft Tai Le"/>
+        <a:font script="Talu" typeface="Microsoft New Tai Lue"/>
+        <a:font script="Tfng" typeface="Ebrima"/>
+      </a:minorFont>
+    </a:fontScheme>
+    <a:fmtScheme name="Office">
+      <a:fillStyleLst>
+        <a:solidFill>
+          <a:schemeClr val="phClr"/>
+        </a:solidFill>
+        <a:gradFill rotWithShape="1">
+          <a:gsLst>
+            <a:gs pos="0">
+              <a:schemeClr val="phClr">
+                <a:lumMod val="110000"/>
+                <a:satMod val="105000"/>
+                <a:tint val="67000"/>
+              </a:schemeClr>
+            </a:gs>
+            <a:gs pos="50000">
+              <a:schemeClr val="phClr">
+                <a:lumMod val="105000"/>
+                <a:satMod val="103000"/>
+                <a:tint val="73000"/>
+              </a:schemeClr>
+            </a:gs>
+            <a:gs pos="100000">
+              <a:schemeClr val="phClr">
+                <a:lumMod val="105000"/>
+                <a:satMod val="109000"/>
+                <a:tint val="81000"/>
+              </a:schemeClr>
+            </a:gs>
+          </a:gsLst>
+          <a:lin ang="5400000" scaled="0"/>
+        </a:gradFill>
+        <a:gradFill rotWithShape="1">
+          <a:gsLst>
+            <a:gs pos="0">
+              <a:schemeClr val="phClr">
+                <a:satMod val="103000"/>
+                <a:lumMod val="102000"/>
+                <a:tint val="94000"/>
+              </a:schemeClr>
+            </a:gs>
+            <a:gs pos="50000">
+              <a:schemeClr val="phClr">
+                <a:satMod val="110000"/>
+                <a:lumMod val="100000"/>
+                <a:shade val="100000"/>
+              </a:schemeClr>
+            </a:gs>
+            <a:gs pos="100000">
+              <a:schemeClr val="phClr">
+                <a:lumMod val="99000"/>
+                <a:satMod val="120000"/>
+                <a:shade val="78000"/>
+              </a:schemeClr>
+            </a:gs>
+          </a:gsLst>
+          <a:lin ang="5400000" scaled="0"/>
+        </a:gradFill>
+      </a:fillStyleLst>
+      <a:lnStyleLst>
+        <a:ln w="12700" cap="flat" cmpd="sng" algn="ctr">
+          <a:solidFill>
+            <a:schemeClr val="phClr"/>
+          </a:solidFill>
+          <a:prstDash val="solid"/>
+          <a:miter lim="800000"/>
+        </a:ln>
+        <a:ln w="19050" cap="flat" cmpd="sng" algn="ctr">
+          <a:solidFill>
+            <a:schemeClr val="phClr"/>
+          </a:solidFill>
+          <a:prstDash val="solid"/>
+          <a:miter lim="800000"/>
+        </a:ln>
+        <a:ln w="25400" cap="flat" cmpd="sng" algn="ctr">
+          <a:solidFill>
+            <a:schemeClr val="phClr"/>
+          </a:solidFill>
+          <a:prstDash val="solid"/>
+          <a:miter lim="800000"/>
+        </a:ln>
+      </a:lnStyleLst>
+      <a:effectStyleLst>
+        <a:effectStyle>
+          <a:effectLst/>
+        </a:effectStyle>
+        <a:effectStyle>
+          <a:effectLst/>
+        </a:effectStyle>
+        <a:effectStyle>
+          <a:effectLst>
+            <a:outerShdw blurRad="57150" dist="19050" dir="5400000" algn="ctr" rotWithShape="0">
+              <a:srgbClr val="000000">
+                <a:alpha val="63000"/>
+              </a:srgbClr>
+            </a:outerShdw>
+          </a:effectLst>
+        </a:effectStyle>
+      </a:effectStyleLst>
+      <a:bgFillStyleLst>
+        <a:solidFill>
+          <a:schemeClr val="phClr"/>
+        </a:solidFill>
+        <a:solidFill>
+          <a:schemeClr val="phClr">
+            <a:tint val="95000"/>
+            <a:satMod val="170000"/>
+          </a:schemeClr>
+        </a:solidFill>
+        <a:gradFill rotWithShape="1">
+          <a:gsLst>
+            <a:gs pos="0">
+              <a:schemeClr val="phClr">
+                <a:tint val="93000"/>
+                <a:satMod val="150000"/>
+                <a:shade val="98000"/>
+                <a:lumMod val="102000"/>
+              </a:schemeClr>
+            </a:gs>
+            <a:gs pos="50000">
+              <a:schemeClr val="phClr">
+                <a:tint val="98000"/>
+                <a:satMod val="130000"/>
+                <a:shade val="90000"/>
+                <a:lumMod val="103000"/>
+              </a:schemeClr>
+            </a:gs>
+            <a:gs pos="100000">
+              <a:schemeClr val="phClr">
+                <a:shade val="63000"/>
+                <a:satMod val="120000"/>
+              </a:schemeClr>
+            </a:gs>
+          </a:gsLst>
+          <a:lin ang="5400000" scaled="0"/>
+        </a:gradFill>
+      </a:bgFillStyleLst>
+    </a:fmtScheme>
+  </a:themeElements>
+  <a:objectDefaults>
+    <a:lnDef>
+      <a:spPr/>
+      <a:bodyPr/>
+      <a:lstStyle/>
+      <a:style>
+        <a:lnRef idx="2">
+          <a:schemeClr val="accent1"/>
+        </a:lnRef>
+        <a:fillRef idx="0">
+          <a:schemeClr val="accent1"/>
+        </a:fillRef>
+        <a:effectRef idx="1">
+          <a:schemeClr val="accent1"/>
+        </a:effectRef>
+        <a:fontRef idx="minor">
+          <a:schemeClr val="tx1"/>
+        </a:fontRef>
+      </a:style>
+    </a:lnDef>
+  </a:objectDefaults>
+  <a:extraClrSchemeLst/>
+  <a:extLst>
+    <a:ext uri="{05A4C25C-085E-4340-85A3-A5531E510DB2}">
+      <thm15:themeFamily xmlns:thm15="http://schemas.microsoft.com/office/thememl/2012/main" name="Office Theme" id="{2E142A2C-CD16-42D6-873A-C26D2A0506FA}" vid="{1BDDFF52-6CD6-40A5-AB3C-68EB2F1E4D0A}"/>
+    </a:ext>
+  </a:extLst>
+</a:theme>
 </file>
</xml_diff>